<commit_message>
Nouvelle version du document de conception de Pierre
</commit_message>
<xml_diff>
--- a/Conception/ANUMBY-RSJ23 validations préliminaires.pptx
+++ b/Conception/ANUMBY-RSJ23 validations préliminaires.pptx
@@ -4,12 +4,20 @@
   <p:sldMasterIdLst>
     <p:sldMasterId id="2147483648" r:id="rId1"/>
   </p:sldMasterIdLst>
+  <p:notesMasterIdLst>
+    <p:notesMasterId r:id="rId9"/>
+  </p:notesMasterIdLst>
+  <p:handoutMasterIdLst>
+    <p:handoutMasterId r:id="rId10"/>
+  </p:handoutMasterIdLst>
   <p:sldIdLst>
     <p:sldId id="256" r:id="rId2"/>
-    <p:sldId id="257" r:id="rId3"/>
-    <p:sldId id="259" r:id="rId4"/>
-    <p:sldId id="260" r:id="rId5"/>
-    <p:sldId id="258" r:id="rId6"/>
+    <p:sldId id="262" r:id="rId3"/>
+    <p:sldId id="261" r:id="rId4"/>
+    <p:sldId id="257" r:id="rId5"/>
+    <p:sldId id="259" r:id="rId6"/>
+    <p:sldId id="260" r:id="rId7"/>
+    <p:sldId id="258" r:id="rId8"/>
   </p:sldIdLst>
   <p:sldSz cx="9144000" cy="6858000" type="screen4x3"/>
   <p:notesSz cx="6858000" cy="9144000"/>
@@ -108,23 +116,786 @@
       </a:defRPr>
     </a:lvl9pPr>
   </p:defaultTextStyle>
-  <p:extLst>
-    <p:ext uri="{EFAFB233-063F-42B5-8137-9DF3F51BA10A}">
-      <p15:sldGuideLst xmlns:p15="http://schemas.microsoft.com/office/powerpoint/2012/main">
-        <p15:guide id="1" orient="horz" pos="2160">
-          <p15:clr>
-            <a:srgbClr val="A4A3A4"/>
-          </p15:clr>
-        </p15:guide>
-        <p15:guide id="2" pos="2880">
-          <p15:clr>
-            <a:srgbClr val="A4A3A4"/>
-          </p15:clr>
-        </p15:guide>
-      </p15:sldGuideLst>
-    </p:ext>
-  </p:extLst>
 </p:presentation>
+</file>
+
+<file path=ppt/handoutMasters/handoutMaster1.xml><?xml version="1.0" encoding="utf-8"?>
+<p:handoutMaster xmlns:a="http://schemas.openxmlformats.org/drawingml/2006/main" xmlns:r="http://schemas.openxmlformats.org/officeDocument/2006/relationships" xmlns:p="http://schemas.openxmlformats.org/presentationml/2006/main">
+  <p:cSld>
+    <p:bg>
+      <p:bgRef idx="1001">
+        <a:schemeClr val="bg1"/>
+      </p:bgRef>
+    </p:bg>
+    <p:spTree>
+      <p:nvGrpSpPr>
+        <p:cNvPr id="1" name=""/>
+        <p:cNvGrpSpPr/>
+        <p:nvPr/>
+      </p:nvGrpSpPr>
+      <p:grpSpPr>
+        <a:xfrm>
+          <a:off x="0" y="0"/>
+          <a:ext cx="0" cy="0"/>
+          <a:chOff x="0" y="0"/>
+          <a:chExt cx="0" cy="0"/>
+        </a:xfrm>
+      </p:grpSpPr>
+      <p:sp>
+        <p:nvSpPr>
+          <p:cNvPr id="2" name="Espace réservé de l'en-tête 1"/>
+          <p:cNvSpPr>
+            <a:spLocks noGrp="1"/>
+          </p:cNvSpPr>
+          <p:nvPr>
+            <p:ph type="hdr" sz="quarter"/>
+          </p:nvPr>
+        </p:nvSpPr>
+        <p:spPr>
+          <a:xfrm>
+            <a:off x="0" y="0"/>
+            <a:ext cx="2971800" cy="457200"/>
+          </a:xfrm>
+          <a:prstGeom prst="rect">
+            <a:avLst/>
+          </a:prstGeom>
+        </p:spPr>
+        <p:txBody>
+          <a:bodyPr vert="horz" lIns="91440" tIns="45720" rIns="91440" bIns="45720" rtlCol="0"/>
+          <a:lstStyle>
+            <a:lvl1pPr algn="l">
+              <a:defRPr sz="1200"/>
+            </a:lvl1pPr>
+          </a:lstStyle>
+          <a:p>
+            <a:r>
+              <a:rPr lang="fr-FR" smtClean="0"/>
+              <a:t>ANUMBY-RSJ23: Qwirkle - Validations préliminaires</a:t>
+            </a:r>
+            <a:endParaRPr lang="fr-FR"/>
+          </a:p>
+        </p:txBody>
+      </p:sp>
+      <p:sp>
+        <p:nvSpPr>
+          <p:cNvPr id="3" name="Espace réservé de la date 2"/>
+          <p:cNvSpPr>
+            <a:spLocks noGrp="1"/>
+          </p:cNvSpPr>
+          <p:nvPr>
+            <p:ph type="dt" sz="quarter" idx="1"/>
+          </p:nvPr>
+        </p:nvSpPr>
+        <p:spPr>
+          <a:xfrm>
+            <a:off x="3884613" y="0"/>
+            <a:ext cx="2971800" cy="457200"/>
+          </a:xfrm>
+          <a:prstGeom prst="rect">
+            <a:avLst/>
+          </a:prstGeom>
+        </p:spPr>
+        <p:txBody>
+          <a:bodyPr vert="horz" lIns="91440" tIns="45720" rIns="91440" bIns="45720" rtlCol="0"/>
+          <a:lstStyle>
+            <a:lvl1pPr algn="r">
+              <a:defRPr sz="1200"/>
+            </a:lvl1pPr>
+          </a:lstStyle>
+          <a:p>
+            <a:fld id="{84FD3874-2BA9-411E-91B3-7A469608C12A}" type="datetimeFigureOut">
+              <a:rPr lang="fr-FR" smtClean="0"/>
+              <a:t>23/11/2022</a:t>
+            </a:fld>
+            <a:endParaRPr lang="fr-FR"/>
+          </a:p>
+        </p:txBody>
+      </p:sp>
+      <p:sp>
+        <p:nvSpPr>
+          <p:cNvPr id="4" name="Espace réservé du pied de page 3"/>
+          <p:cNvSpPr>
+            <a:spLocks noGrp="1"/>
+          </p:cNvSpPr>
+          <p:nvPr>
+            <p:ph type="ftr" sz="quarter" idx="2"/>
+          </p:nvPr>
+        </p:nvSpPr>
+        <p:spPr>
+          <a:xfrm>
+            <a:off x="0" y="8685213"/>
+            <a:ext cx="2971800" cy="457200"/>
+          </a:xfrm>
+          <a:prstGeom prst="rect">
+            <a:avLst/>
+          </a:prstGeom>
+        </p:spPr>
+        <p:txBody>
+          <a:bodyPr vert="horz" lIns="91440" tIns="45720" rIns="91440" bIns="45720" rtlCol="0" anchor="b"/>
+          <a:lstStyle>
+            <a:lvl1pPr algn="l">
+              <a:defRPr sz="1200"/>
+            </a:lvl1pPr>
+          </a:lstStyle>
+          <a:p>
+            <a:r>
+              <a:rPr lang="fr-FR" smtClean="0"/>
+              <a:t>ed 01 du 23nov22</a:t>
+            </a:r>
+            <a:endParaRPr lang="fr-FR"/>
+          </a:p>
+        </p:txBody>
+      </p:sp>
+      <p:sp>
+        <p:nvSpPr>
+          <p:cNvPr id="5" name="Espace réservé du numéro de diapositive 4"/>
+          <p:cNvSpPr>
+            <a:spLocks noGrp="1"/>
+          </p:cNvSpPr>
+          <p:nvPr>
+            <p:ph type="sldNum" sz="quarter" idx="3"/>
+          </p:nvPr>
+        </p:nvSpPr>
+        <p:spPr>
+          <a:xfrm>
+            <a:off x="3884613" y="8685213"/>
+            <a:ext cx="2971800" cy="457200"/>
+          </a:xfrm>
+          <a:prstGeom prst="rect">
+            <a:avLst/>
+          </a:prstGeom>
+        </p:spPr>
+        <p:txBody>
+          <a:bodyPr vert="horz" lIns="91440" tIns="45720" rIns="91440" bIns="45720" rtlCol="0" anchor="b"/>
+          <a:lstStyle>
+            <a:lvl1pPr algn="r">
+              <a:defRPr sz="1200"/>
+            </a:lvl1pPr>
+          </a:lstStyle>
+          <a:p>
+            <a:fld id="{8AB64B42-5FC9-4DC4-BA15-D32070125DCA}" type="slidenum">
+              <a:rPr lang="fr-FR" smtClean="0"/>
+              <a:t>‹N°›</a:t>
+            </a:fld>
+            <a:endParaRPr lang="fr-FR"/>
+          </a:p>
+        </p:txBody>
+      </p:sp>
+    </p:spTree>
+  </p:cSld>
+  <p:clrMap bg1="lt1" tx1="dk1" bg2="lt2" tx2="dk2" accent1="accent1" accent2="accent2" accent3="accent3" accent4="accent4" accent5="accent5" accent6="accent6" hlink="hlink" folHlink="folHlink"/>
+  <p:hf dt="0"/>
+</p:handoutMaster>
+</file>
+
+<file path=ppt/notesMasters/notesMaster1.xml><?xml version="1.0" encoding="utf-8"?>
+<p:notesMaster xmlns:a="http://schemas.openxmlformats.org/drawingml/2006/main" xmlns:r="http://schemas.openxmlformats.org/officeDocument/2006/relationships" xmlns:p="http://schemas.openxmlformats.org/presentationml/2006/main">
+  <p:cSld>
+    <p:bg>
+      <p:bgRef idx="1001">
+        <a:schemeClr val="bg1"/>
+      </p:bgRef>
+    </p:bg>
+    <p:spTree>
+      <p:nvGrpSpPr>
+        <p:cNvPr id="1" name=""/>
+        <p:cNvGrpSpPr/>
+        <p:nvPr/>
+      </p:nvGrpSpPr>
+      <p:grpSpPr>
+        <a:xfrm>
+          <a:off x="0" y="0"/>
+          <a:ext cx="0" cy="0"/>
+          <a:chOff x="0" y="0"/>
+          <a:chExt cx="0" cy="0"/>
+        </a:xfrm>
+      </p:grpSpPr>
+      <p:sp>
+        <p:nvSpPr>
+          <p:cNvPr id="2" name="Espace réservé de l'en-tête 1"/>
+          <p:cNvSpPr>
+            <a:spLocks noGrp="1"/>
+          </p:cNvSpPr>
+          <p:nvPr>
+            <p:ph type="hdr" sz="quarter"/>
+          </p:nvPr>
+        </p:nvSpPr>
+        <p:spPr>
+          <a:xfrm>
+            <a:off x="0" y="0"/>
+            <a:ext cx="2971800" cy="457200"/>
+          </a:xfrm>
+          <a:prstGeom prst="rect">
+            <a:avLst/>
+          </a:prstGeom>
+        </p:spPr>
+        <p:txBody>
+          <a:bodyPr vert="horz" lIns="91440" tIns="45720" rIns="91440" bIns="45720" rtlCol="0"/>
+          <a:lstStyle>
+            <a:lvl1pPr algn="l">
+              <a:defRPr sz="1200"/>
+            </a:lvl1pPr>
+          </a:lstStyle>
+          <a:p>
+            <a:r>
+              <a:rPr lang="fr-FR" smtClean="0"/>
+              <a:t>ANUMBY-RSJ23: Qwirkle - Validations préliminaires</a:t>
+            </a:r>
+            <a:endParaRPr lang="fr-FR"/>
+          </a:p>
+        </p:txBody>
+      </p:sp>
+      <p:sp>
+        <p:nvSpPr>
+          <p:cNvPr id="3" name="Espace réservé de la date 2"/>
+          <p:cNvSpPr>
+            <a:spLocks noGrp="1"/>
+          </p:cNvSpPr>
+          <p:nvPr>
+            <p:ph type="dt" idx="1"/>
+          </p:nvPr>
+        </p:nvSpPr>
+        <p:spPr>
+          <a:xfrm>
+            <a:off x="3884613" y="0"/>
+            <a:ext cx="2971800" cy="457200"/>
+          </a:xfrm>
+          <a:prstGeom prst="rect">
+            <a:avLst/>
+          </a:prstGeom>
+        </p:spPr>
+        <p:txBody>
+          <a:bodyPr vert="horz" lIns="91440" tIns="45720" rIns="91440" bIns="45720" rtlCol="0"/>
+          <a:lstStyle>
+            <a:lvl1pPr algn="r">
+              <a:defRPr sz="1200"/>
+            </a:lvl1pPr>
+          </a:lstStyle>
+          <a:p>
+            <a:fld id="{A20E5592-E8F2-4077-90E8-29A41CA37A51}" type="datetimeFigureOut">
+              <a:rPr lang="fr-FR" smtClean="0"/>
+              <a:t>23/11/2022</a:t>
+            </a:fld>
+            <a:endParaRPr lang="fr-FR"/>
+          </a:p>
+        </p:txBody>
+      </p:sp>
+      <p:sp>
+        <p:nvSpPr>
+          <p:cNvPr id="4" name="Espace réservé de l'image des diapositives 3"/>
+          <p:cNvSpPr>
+            <a:spLocks noGrp="1" noRot="1" noChangeAspect="1"/>
+          </p:cNvSpPr>
+          <p:nvPr>
+            <p:ph type="sldImg" idx="2"/>
+          </p:nvPr>
+        </p:nvSpPr>
+        <p:spPr>
+          <a:xfrm>
+            <a:off x="1143000" y="685800"/>
+            <a:ext cx="4572000" cy="3429000"/>
+          </a:xfrm>
+          <a:prstGeom prst="rect">
+            <a:avLst/>
+          </a:prstGeom>
+          <a:noFill/>
+          <a:ln w="12700">
+            <a:solidFill>
+              <a:prstClr val="black"/>
+            </a:solidFill>
+          </a:ln>
+        </p:spPr>
+        <p:txBody>
+          <a:bodyPr vert="horz" lIns="91440" tIns="45720" rIns="91440" bIns="45720" rtlCol="0" anchor="ctr"/>
+          <a:lstStyle/>
+          <a:p>
+            <a:endParaRPr lang="fr-FR"/>
+          </a:p>
+        </p:txBody>
+      </p:sp>
+      <p:sp>
+        <p:nvSpPr>
+          <p:cNvPr id="5" name="Espace réservé des commentaires 4"/>
+          <p:cNvSpPr>
+            <a:spLocks noGrp="1"/>
+          </p:cNvSpPr>
+          <p:nvPr>
+            <p:ph type="body" sz="quarter" idx="3"/>
+          </p:nvPr>
+        </p:nvSpPr>
+        <p:spPr>
+          <a:xfrm>
+            <a:off x="685800" y="4343400"/>
+            <a:ext cx="5486400" cy="4114800"/>
+          </a:xfrm>
+          <a:prstGeom prst="rect">
+            <a:avLst/>
+          </a:prstGeom>
+        </p:spPr>
+        <p:txBody>
+          <a:bodyPr vert="horz" lIns="91440" tIns="45720" rIns="91440" bIns="45720" rtlCol="0">
+            <a:normAutofit/>
+          </a:bodyPr>
+          <a:lstStyle/>
+          <a:p>
+            <a:pPr lvl="0"/>
+            <a:r>
+              <a:rPr lang="fr-FR" smtClean="0"/>
+              <a:t>Cliquez pour modifier les styles du texte du masque</a:t>
+            </a:r>
+          </a:p>
+          <a:p>
+            <a:pPr lvl="1"/>
+            <a:r>
+              <a:rPr lang="fr-FR" smtClean="0"/>
+              <a:t>Deuxième niveau</a:t>
+            </a:r>
+          </a:p>
+          <a:p>
+            <a:pPr lvl="2"/>
+            <a:r>
+              <a:rPr lang="fr-FR" smtClean="0"/>
+              <a:t>Troisième niveau</a:t>
+            </a:r>
+          </a:p>
+          <a:p>
+            <a:pPr lvl="3"/>
+            <a:r>
+              <a:rPr lang="fr-FR" smtClean="0"/>
+              <a:t>Quatrième niveau</a:t>
+            </a:r>
+          </a:p>
+          <a:p>
+            <a:pPr lvl="4"/>
+            <a:r>
+              <a:rPr lang="fr-FR" smtClean="0"/>
+              <a:t>Cinquième niveau</a:t>
+            </a:r>
+            <a:endParaRPr lang="fr-FR"/>
+          </a:p>
+        </p:txBody>
+      </p:sp>
+      <p:sp>
+        <p:nvSpPr>
+          <p:cNvPr id="6" name="Espace réservé du pied de page 5"/>
+          <p:cNvSpPr>
+            <a:spLocks noGrp="1"/>
+          </p:cNvSpPr>
+          <p:nvPr>
+            <p:ph type="ftr" sz="quarter" idx="4"/>
+          </p:nvPr>
+        </p:nvSpPr>
+        <p:spPr>
+          <a:xfrm>
+            <a:off x="0" y="8685213"/>
+            <a:ext cx="2971800" cy="457200"/>
+          </a:xfrm>
+          <a:prstGeom prst="rect">
+            <a:avLst/>
+          </a:prstGeom>
+        </p:spPr>
+        <p:txBody>
+          <a:bodyPr vert="horz" lIns="91440" tIns="45720" rIns="91440" bIns="45720" rtlCol="0" anchor="b"/>
+          <a:lstStyle>
+            <a:lvl1pPr algn="l">
+              <a:defRPr sz="1200"/>
+            </a:lvl1pPr>
+          </a:lstStyle>
+          <a:p>
+            <a:r>
+              <a:rPr lang="fr-FR" smtClean="0"/>
+              <a:t>ed 01 du 23nov22</a:t>
+            </a:r>
+            <a:endParaRPr lang="fr-FR"/>
+          </a:p>
+        </p:txBody>
+      </p:sp>
+      <p:sp>
+        <p:nvSpPr>
+          <p:cNvPr id="7" name="Espace réservé du numéro de diapositive 6"/>
+          <p:cNvSpPr>
+            <a:spLocks noGrp="1"/>
+          </p:cNvSpPr>
+          <p:nvPr>
+            <p:ph type="sldNum" sz="quarter" idx="5"/>
+          </p:nvPr>
+        </p:nvSpPr>
+        <p:spPr>
+          <a:xfrm>
+            <a:off x="3884613" y="8685213"/>
+            <a:ext cx="2971800" cy="457200"/>
+          </a:xfrm>
+          <a:prstGeom prst="rect">
+            <a:avLst/>
+          </a:prstGeom>
+        </p:spPr>
+        <p:txBody>
+          <a:bodyPr vert="horz" lIns="91440" tIns="45720" rIns="91440" bIns="45720" rtlCol="0" anchor="b"/>
+          <a:lstStyle>
+            <a:lvl1pPr algn="r">
+              <a:defRPr sz="1200"/>
+            </a:lvl1pPr>
+          </a:lstStyle>
+          <a:p>
+            <a:fld id="{4E633600-EFDA-435B-9FC2-8F34C45F826A}" type="slidenum">
+              <a:rPr lang="fr-FR" smtClean="0"/>
+              <a:t>‹N°›</a:t>
+            </a:fld>
+            <a:endParaRPr lang="fr-FR"/>
+          </a:p>
+        </p:txBody>
+      </p:sp>
+    </p:spTree>
+  </p:cSld>
+  <p:clrMap bg1="lt1" tx1="dk1" bg2="lt2" tx2="dk2" accent1="accent1" accent2="accent2" accent3="accent3" accent4="accent4" accent5="accent5" accent6="accent6" hlink="hlink" folHlink="folHlink"/>
+  <p:hf dt="0"/>
+  <p:notesStyle>
+    <a:lvl1pPr marL="0" algn="l" defTabSz="914400" rtl="0" eaLnBrk="1" latinLnBrk="0" hangingPunct="1">
+      <a:defRPr sz="1200" kern="1200">
+        <a:solidFill>
+          <a:schemeClr val="tx1"/>
+        </a:solidFill>
+        <a:latin typeface="+mn-lt"/>
+        <a:ea typeface="+mn-ea"/>
+        <a:cs typeface="+mn-cs"/>
+      </a:defRPr>
+    </a:lvl1pPr>
+    <a:lvl2pPr marL="457200" algn="l" defTabSz="914400" rtl="0" eaLnBrk="1" latinLnBrk="0" hangingPunct="1">
+      <a:defRPr sz="1200" kern="1200">
+        <a:solidFill>
+          <a:schemeClr val="tx1"/>
+        </a:solidFill>
+        <a:latin typeface="+mn-lt"/>
+        <a:ea typeface="+mn-ea"/>
+        <a:cs typeface="+mn-cs"/>
+      </a:defRPr>
+    </a:lvl2pPr>
+    <a:lvl3pPr marL="914400" algn="l" defTabSz="914400" rtl="0" eaLnBrk="1" latinLnBrk="0" hangingPunct="1">
+      <a:defRPr sz="1200" kern="1200">
+        <a:solidFill>
+          <a:schemeClr val="tx1"/>
+        </a:solidFill>
+        <a:latin typeface="+mn-lt"/>
+        <a:ea typeface="+mn-ea"/>
+        <a:cs typeface="+mn-cs"/>
+      </a:defRPr>
+    </a:lvl3pPr>
+    <a:lvl4pPr marL="1371600" algn="l" defTabSz="914400" rtl="0" eaLnBrk="1" latinLnBrk="0" hangingPunct="1">
+      <a:defRPr sz="1200" kern="1200">
+        <a:solidFill>
+          <a:schemeClr val="tx1"/>
+        </a:solidFill>
+        <a:latin typeface="+mn-lt"/>
+        <a:ea typeface="+mn-ea"/>
+        <a:cs typeface="+mn-cs"/>
+      </a:defRPr>
+    </a:lvl4pPr>
+    <a:lvl5pPr marL="1828800" algn="l" defTabSz="914400" rtl="0" eaLnBrk="1" latinLnBrk="0" hangingPunct="1">
+      <a:defRPr sz="1200" kern="1200">
+        <a:solidFill>
+          <a:schemeClr val="tx1"/>
+        </a:solidFill>
+        <a:latin typeface="+mn-lt"/>
+        <a:ea typeface="+mn-ea"/>
+        <a:cs typeface="+mn-cs"/>
+      </a:defRPr>
+    </a:lvl5pPr>
+    <a:lvl6pPr marL="2286000" algn="l" defTabSz="914400" rtl="0" eaLnBrk="1" latinLnBrk="0" hangingPunct="1">
+      <a:defRPr sz="1200" kern="1200">
+        <a:solidFill>
+          <a:schemeClr val="tx1"/>
+        </a:solidFill>
+        <a:latin typeface="+mn-lt"/>
+        <a:ea typeface="+mn-ea"/>
+        <a:cs typeface="+mn-cs"/>
+      </a:defRPr>
+    </a:lvl6pPr>
+    <a:lvl7pPr marL="2743200" algn="l" defTabSz="914400" rtl="0" eaLnBrk="1" latinLnBrk="0" hangingPunct="1">
+      <a:defRPr sz="1200" kern="1200">
+        <a:solidFill>
+          <a:schemeClr val="tx1"/>
+        </a:solidFill>
+        <a:latin typeface="+mn-lt"/>
+        <a:ea typeface="+mn-ea"/>
+        <a:cs typeface="+mn-cs"/>
+      </a:defRPr>
+    </a:lvl7pPr>
+    <a:lvl8pPr marL="3200400" algn="l" defTabSz="914400" rtl="0" eaLnBrk="1" latinLnBrk="0" hangingPunct="1">
+      <a:defRPr sz="1200" kern="1200">
+        <a:solidFill>
+          <a:schemeClr val="tx1"/>
+        </a:solidFill>
+        <a:latin typeface="+mn-lt"/>
+        <a:ea typeface="+mn-ea"/>
+        <a:cs typeface="+mn-cs"/>
+      </a:defRPr>
+    </a:lvl8pPr>
+    <a:lvl9pPr marL="3657600" algn="l" defTabSz="914400" rtl="0" eaLnBrk="1" latinLnBrk="0" hangingPunct="1">
+      <a:defRPr sz="1200" kern="1200">
+        <a:solidFill>
+          <a:schemeClr val="tx1"/>
+        </a:solidFill>
+        <a:latin typeface="+mn-lt"/>
+        <a:ea typeface="+mn-ea"/>
+        <a:cs typeface="+mn-cs"/>
+      </a:defRPr>
+    </a:lvl9pPr>
+  </p:notesStyle>
+</p:notesMaster>
+</file>
+
+<file path=ppt/notesSlides/notesSlide1.xml><?xml version="1.0" encoding="utf-8"?>
+<p:notes xmlns:a="http://schemas.openxmlformats.org/drawingml/2006/main" xmlns:r="http://schemas.openxmlformats.org/officeDocument/2006/relationships" xmlns:p="http://schemas.openxmlformats.org/presentationml/2006/main">
+  <p:cSld>
+    <p:spTree>
+      <p:nvGrpSpPr>
+        <p:cNvPr id="1" name=""/>
+        <p:cNvGrpSpPr/>
+        <p:nvPr/>
+      </p:nvGrpSpPr>
+      <p:grpSpPr>
+        <a:xfrm>
+          <a:off x="0" y="0"/>
+          <a:ext cx="0" cy="0"/>
+          <a:chOff x="0" y="0"/>
+          <a:chExt cx="0" cy="0"/>
+        </a:xfrm>
+      </p:grpSpPr>
+      <p:sp>
+        <p:nvSpPr>
+          <p:cNvPr id="2" name="Espace réservé de l'image des diapositives 1"/>
+          <p:cNvSpPr>
+            <a:spLocks noGrp="1" noRot="1" noChangeAspect="1"/>
+          </p:cNvSpPr>
+          <p:nvPr>
+            <p:ph type="sldImg"/>
+          </p:nvPr>
+        </p:nvSpPr>
+        <p:spPr/>
+      </p:sp>
+      <p:sp>
+        <p:nvSpPr>
+          <p:cNvPr id="3" name="Espace réservé des commentaires 2"/>
+          <p:cNvSpPr>
+            <a:spLocks noGrp="1"/>
+          </p:cNvSpPr>
+          <p:nvPr>
+            <p:ph type="body" idx="1"/>
+          </p:nvPr>
+        </p:nvSpPr>
+        <p:spPr/>
+        <p:txBody>
+          <a:bodyPr>
+            <a:normAutofit/>
+          </a:bodyPr>
+          <a:lstStyle/>
+          <a:p>
+            <a:endParaRPr lang="fr-FR"/>
+          </a:p>
+        </p:txBody>
+      </p:sp>
+      <p:sp>
+        <p:nvSpPr>
+          <p:cNvPr id="4" name="Espace réservé du numéro de diapositive 3"/>
+          <p:cNvSpPr>
+            <a:spLocks noGrp="1"/>
+          </p:cNvSpPr>
+          <p:nvPr>
+            <p:ph type="sldNum" sz="quarter" idx="10"/>
+          </p:nvPr>
+        </p:nvSpPr>
+        <p:spPr/>
+        <p:txBody>
+          <a:bodyPr/>
+          <a:lstStyle/>
+          <a:p>
+            <a:fld id="{4E633600-EFDA-435B-9FC2-8F34C45F826A}" type="slidenum">
+              <a:rPr lang="fr-FR" smtClean="0"/>
+              <a:t>1</a:t>
+            </a:fld>
+            <a:endParaRPr lang="fr-FR"/>
+          </a:p>
+        </p:txBody>
+      </p:sp>
+      <p:sp>
+        <p:nvSpPr>
+          <p:cNvPr id="5" name="Espace réservé du pied de page 4"/>
+          <p:cNvSpPr>
+            <a:spLocks noGrp="1"/>
+          </p:cNvSpPr>
+          <p:nvPr>
+            <p:ph type="ftr" sz="quarter" idx="11"/>
+          </p:nvPr>
+        </p:nvSpPr>
+        <p:spPr/>
+        <p:txBody>
+          <a:bodyPr/>
+          <a:lstStyle/>
+          <a:p>
+            <a:r>
+              <a:rPr lang="fr-FR" smtClean="0"/>
+              <a:t>ed 01 du 23nov22</a:t>
+            </a:r>
+            <a:endParaRPr lang="fr-FR"/>
+          </a:p>
+        </p:txBody>
+      </p:sp>
+      <p:sp>
+        <p:nvSpPr>
+          <p:cNvPr id="6" name="Espace réservé de l'en-tête 5"/>
+          <p:cNvSpPr>
+            <a:spLocks noGrp="1"/>
+          </p:cNvSpPr>
+          <p:nvPr>
+            <p:ph type="hdr" sz="quarter" idx="12"/>
+          </p:nvPr>
+        </p:nvSpPr>
+        <p:spPr/>
+        <p:txBody>
+          <a:bodyPr/>
+          <a:lstStyle/>
+          <a:p>
+            <a:r>
+              <a:rPr lang="fr-FR" smtClean="0"/>
+              <a:t>ANUMBY-RSJ23: Qwirkle - Validations préliminaires</a:t>
+            </a:r>
+            <a:endParaRPr lang="fr-FR"/>
+          </a:p>
+        </p:txBody>
+      </p:sp>
+    </p:spTree>
+  </p:cSld>
+  <p:clrMapOvr>
+    <a:masterClrMapping/>
+  </p:clrMapOvr>
+</p:notes>
+</file>
+
+<file path=ppt/notesSlides/notesSlide2.xml><?xml version="1.0" encoding="utf-8"?>
+<p:notes xmlns:a="http://schemas.openxmlformats.org/drawingml/2006/main" xmlns:r="http://schemas.openxmlformats.org/officeDocument/2006/relationships" xmlns:p="http://schemas.openxmlformats.org/presentationml/2006/main">
+  <p:cSld>
+    <p:spTree>
+      <p:nvGrpSpPr>
+        <p:cNvPr id="1" name=""/>
+        <p:cNvGrpSpPr/>
+        <p:nvPr/>
+      </p:nvGrpSpPr>
+      <p:grpSpPr>
+        <a:xfrm>
+          <a:off x="0" y="0"/>
+          <a:ext cx="0" cy="0"/>
+          <a:chOff x="0" y="0"/>
+          <a:chExt cx="0" cy="0"/>
+        </a:xfrm>
+      </p:grpSpPr>
+      <p:sp>
+        <p:nvSpPr>
+          <p:cNvPr id="2" name="Espace réservé de l'image des diapositives 1"/>
+          <p:cNvSpPr>
+            <a:spLocks noGrp="1" noRot="1" noChangeAspect="1"/>
+          </p:cNvSpPr>
+          <p:nvPr>
+            <p:ph type="sldImg"/>
+          </p:nvPr>
+        </p:nvSpPr>
+        <p:spPr/>
+      </p:sp>
+      <p:sp>
+        <p:nvSpPr>
+          <p:cNvPr id="3" name="Espace réservé des commentaires 2"/>
+          <p:cNvSpPr>
+            <a:spLocks noGrp="1"/>
+          </p:cNvSpPr>
+          <p:nvPr>
+            <p:ph type="body" idx="1"/>
+          </p:nvPr>
+        </p:nvSpPr>
+        <p:spPr/>
+        <p:txBody>
+          <a:bodyPr>
+            <a:normAutofit/>
+          </a:bodyPr>
+          <a:lstStyle/>
+          <a:p>
+            <a:endParaRPr lang="fr-FR"/>
+          </a:p>
+        </p:txBody>
+      </p:sp>
+      <p:sp>
+        <p:nvSpPr>
+          <p:cNvPr id="4" name="Espace réservé du numéro de diapositive 3"/>
+          <p:cNvSpPr>
+            <a:spLocks noGrp="1"/>
+          </p:cNvSpPr>
+          <p:nvPr>
+            <p:ph type="sldNum" sz="quarter" idx="10"/>
+          </p:nvPr>
+        </p:nvSpPr>
+        <p:spPr/>
+        <p:txBody>
+          <a:bodyPr/>
+          <a:lstStyle/>
+          <a:p>
+            <a:fld id="{4E633600-EFDA-435B-9FC2-8F34C45F826A}" type="slidenum">
+              <a:rPr lang="fr-FR" smtClean="0"/>
+              <a:t>2</a:t>
+            </a:fld>
+            <a:endParaRPr lang="fr-FR"/>
+          </a:p>
+        </p:txBody>
+      </p:sp>
+      <p:sp>
+        <p:nvSpPr>
+          <p:cNvPr id="5" name="Espace réservé du pied de page 4"/>
+          <p:cNvSpPr>
+            <a:spLocks noGrp="1"/>
+          </p:cNvSpPr>
+          <p:nvPr>
+            <p:ph type="ftr" sz="quarter" idx="11"/>
+          </p:nvPr>
+        </p:nvSpPr>
+        <p:spPr/>
+        <p:txBody>
+          <a:bodyPr/>
+          <a:lstStyle/>
+          <a:p>
+            <a:r>
+              <a:rPr lang="fr-FR" smtClean="0"/>
+              <a:t>ed 01 du 23nov22</a:t>
+            </a:r>
+            <a:endParaRPr lang="fr-FR"/>
+          </a:p>
+        </p:txBody>
+      </p:sp>
+      <p:sp>
+        <p:nvSpPr>
+          <p:cNvPr id="6" name="Espace réservé de l'en-tête 5"/>
+          <p:cNvSpPr>
+            <a:spLocks noGrp="1"/>
+          </p:cNvSpPr>
+          <p:nvPr>
+            <p:ph type="hdr" sz="quarter" idx="12"/>
+          </p:nvPr>
+        </p:nvSpPr>
+        <p:spPr/>
+        <p:txBody>
+          <a:bodyPr/>
+          <a:lstStyle/>
+          <a:p>
+            <a:r>
+              <a:rPr lang="fr-FR" smtClean="0"/>
+              <a:t>ANUMBY-RSJ23: Qwirkle - Validations préliminaires</a:t>
+            </a:r>
+            <a:endParaRPr lang="fr-FR"/>
+          </a:p>
+        </p:txBody>
+      </p:sp>
+    </p:spTree>
+  </p:cSld>
+  <p:clrMapOvr>
+    <a:masterClrMapping/>
+  </p:clrMapOvr>
+</p:notes>
 </file>
 
 <file path=ppt/slideLayouts/slideLayout1.xml><?xml version="1.0" encoding="utf-8"?>
@@ -306,10 +1077,9 @@
           <a:bodyPr/>
           <a:lstStyle/>
           <a:p>
-            <a:fld id="{42B26559-BDF3-4C8C-AEBE-D543EFCD858C}" type="datetimeFigureOut">
-              <a:rPr lang="fr-FR" smtClean="0"/>
-              <a:pPr/>
-              <a:t>22/11/2022</a:t>
+            <a:fld id="{814B3E0D-0D77-4B82-B2D3-373AD20BB387}" type="datetime1">
+              <a:rPr lang="fr-FR" smtClean="0"/>
+              <a:t>23/11/2022</a:t>
             </a:fld>
             <a:endParaRPr lang="fr-FR"/>
           </a:p>
@@ -473,10 +1243,9 @@
           <a:bodyPr/>
           <a:lstStyle/>
           <a:p>
-            <a:fld id="{42B26559-BDF3-4C8C-AEBE-D543EFCD858C}" type="datetimeFigureOut">
-              <a:rPr lang="fr-FR" smtClean="0"/>
-              <a:pPr/>
-              <a:t>22/11/2022</a:t>
+            <a:fld id="{3A8B43D8-DFC2-40A5-AE0F-16B7BD8C635F}" type="datetime1">
+              <a:rPr lang="fr-FR" smtClean="0"/>
+              <a:t>23/11/2022</a:t>
             </a:fld>
             <a:endParaRPr lang="fr-FR"/>
           </a:p>
@@ -650,10 +1419,9 @@
           <a:bodyPr/>
           <a:lstStyle/>
           <a:p>
-            <a:fld id="{42B26559-BDF3-4C8C-AEBE-D543EFCD858C}" type="datetimeFigureOut">
-              <a:rPr lang="fr-FR" smtClean="0"/>
-              <a:pPr/>
-              <a:t>22/11/2022</a:t>
+            <a:fld id="{4D634580-6121-4570-A937-C74D52F6635E}" type="datetime1">
+              <a:rPr lang="fr-FR" smtClean="0"/>
+              <a:t>23/11/2022</a:t>
             </a:fld>
             <a:endParaRPr lang="fr-FR"/>
           </a:p>
@@ -817,10 +1585,9 @@
           <a:bodyPr/>
           <a:lstStyle/>
           <a:p>
-            <a:fld id="{42B26559-BDF3-4C8C-AEBE-D543EFCD858C}" type="datetimeFigureOut">
-              <a:rPr lang="fr-FR" smtClean="0"/>
-              <a:pPr/>
-              <a:t>22/11/2022</a:t>
+            <a:fld id="{30660DB9-5095-4007-9E71-D853FA15084A}" type="datetime1">
+              <a:rPr lang="fr-FR" smtClean="0"/>
+              <a:t>23/11/2022</a:t>
             </a:fld>
             <a:endParaRPr lang="fr-FR"/>
           </a:p>
@@ -1060,10 +1827,9 @@
           <a:bodyPr/>
           <a:lstStyle/>
           <a:p>
-            <a:fld id="{42B26559-BDF3-4C8C-AEBE-D543EFCD858C}" type="datetimeFigureOut">
-              <a:rPr lang="fr-FR" smtClean="0"/>
-              <a:pPr/>
-              <a:t>22/11/2022</a:t>
+            <a:fld id="{172AE902-1C47-451E-8510-872A27EF5BB1}" type="datetime1">
+              <a:rPr lang="fr-FR" smtClean="0"/>
+              <a:t>23/11/2022</a:t>
             </a:fld>
             <a:endParaRPr lang="fr-FR"/>
           </a:p>
@@ -1345,10 +2111,9 @@
           <a:bodyPr/>
           <a:lstStyle/>
           <a:p>
-            <a:fld id="{42B26559-BDF3-4C8C-AEBE-D543EFCD858C}" type="datetimeFigureOut">
-              <a:rPr lang="fr-FR" smtClean="0"/>
-              <a:pPr/>
-              <a:t>22/11/2022</a:t>
+            <a:fld id="{9FB87681-4DBC-47F5-A720-2BCBBC16E822}" type="datetime1">
+              <a:rPr lang="fr-FR" smtClean="0"/>
+              <a:t>23/11/2022</a:t>
             </a:fld>
             <a:endParaRPr lang="fr-FR"/>
           </a:p>
@@ -1764,10 +2529,9 @@
           <a:bodyPr/>
           <a:lstStyle/>
           <a:p>
-            <a:fld id="{42B26559-BDF3-4C8C-AEBE-D543EFCD858C}" type="datetimeFigureOut">
-              <a:rPr lang="fr-FR" smtClean="0"/>
-              <a:pPr/>
-              <a:t>22/11/2022</a:t>
+            <a:fld id="{A89D6F07-B421-4CB7-ABF3-C9276090BF8F}" type="datetime1">
+              <a:rPr lang="fr-FR" smtClean="0"/>
+              <a:t>23/11/2022</a:t>
             </a:fld>
             <a:endParaRPr lang="fr-FR"/>
           </a:p>
@@ -1879,10 +2643,9 @@
           <a:bodyPr/>
           <a:lstStyle/>
           <a:p>
-            <a:fld id="{42B26559-BDF3-4C8C-AEBE-D543EFCD858C}" type="datetimeFigureOut">
-              <a:rPr lang="fr-FR" smtClean="0"/>
-              <a:pPr/>
-              <a:t>22/11/2022</a:t>
+            <a:fld id="{00429903-047A-4B4D-B4F5-5900CE6BF6E9}" type="datetime1">
+              <a:rPr lang="fr-FR" smtClean="0"/>
+              <a:t>23/11/2022</a:t>
             </a:fld>
             <a:endParaRPr lang="fr-FR"/>
           </a:p>
@@ -1971,10 +2734,9 @@
           <a:bodyPr/>
           <a:lstStyle/>
           <a:p>
-            <a:fld id="{42B26559-BDF3-4C8C-AEBE-D543EFCD858C}" type="datetimeFigureOut">
-              <a:rPr lang="fr-FR" smtClean="0"/>
-              <a:pPr/>
-              <a:t>22/11/2022</a:t>
+            <a:fld id="{FCB63D75-89E8-476D-91BB-E84C736ED5B6}" type="datetime1">
+              <a:rPr lang="fr-FR" smtClean="0"/>
+              <a:t>23/11/2022</a:t>
             </a:fld>
             <a:endParaRPr lang="fr-FR"/>
           </a:p>
@@ -2245,10 +3007,9 @@
           <a:bodyPr/>
           <a:lstStyle/>
           <a:p>
-            <a:fld id="{42B26559-BDF3-4C8C-AEBE-D543EFCD858C}" type="datetimeFigureOut">
-              <a:rPr lang="fr-FR" smtClean="0"/>
-              <a:pPr/>
-              <a:t>22/11/2022</a:t>
+            <a:fld id="{F7AA4510-57D1-44A9-9273-4FB31F047125}" type="datetime1">
+              <a:rPr lang="fr-FR" smtClean="0"/>
+              <a:t>23/11/2022</a:t>
             </a:fld>
             <a:endParaRPr lang="fr-FR"/>
           </a:p>
@@ -2495,10 +3256,9 @@
           <a:bodyPr/>
           <a:lstStyle/>
           <a:p>
-            <a:fld id="{42B26559-BDF3-4C8C-AEBE-D543EFCD858C}" type="datetimeFigureOut">
-              <a:rPr lang="fr-FR" smtClean="0"/>
-              <a:pPr/>
-              <a:t>22/11/2022</a:t>
+            <a:fld id="{430B7A47-C1DC-40E1-B9E7-5C3383609E40}" type="datetime1">
+              <a:rPr lang="fr-FR" smtClean="0"/>
+              <a:t>23/11/2022</a:t>
             </a:fld>
             <a:endParaRPr lang="fr-FR"/>
           </a:p>
@@ -2705,10 +3465,9 @@
             </a:lvl1pPr>
           </a:lstStyle>
           <a:p>
-            <a:fld id="{42B26559-BDF3-4C8C-AEBE-D543EFCD858C}" type="datetimeFigureOut">
-              <a:rPr lang="fr-FR" smtClean="0"/>
-              <a:pPr/>
-              <a:t>22/11/2022</a:t>
+            <a:fld id="{2E7C078B-CB04-4E39-89DA-FB2B54446105}" type="datetime1">
+              <a:rPr lang="fr-FR" smtClean="0"/>
+              <a:t>23/11/2022</a:t>
             </a:fld>
             <a:endParaRPr lang="fr-FR"/>
           </a:p>
@@ -2809,6 +3568,7 @@
     <p:sldLayoutId id="2147483658" r:id="rId10"/>
     <p:sldLayoutId id="2147483659" r:id="rId11"/>
   </p:sldLayoutIdLst>
+  <p:hf hdr="0" ftr="0" dt="0"/>
   <p:txStyles>
     <p:titleStyle>
       <a:lvl1pPr algn="ctr" defTabSz="914400" rtl="0" eaLnBrk="1" latinLnBrk="0" hangingPunct="1">
@@ -3091,7 +3851,7 @@
         </p:nvSpPr>
         <p:spPr>
           <a:xfrm>
-            <a:off x="611560" y="116632"/>
+            <a:off x="611560" y="332656"/>
             <a:ext cx="7772400" cy="648072"/>
           </a:xfrm>
         </p:spPr>
@@ -3117,8 +3877,8 @@
         </p:nvSpPr>
         <p:spPr>
           <a:xfrm>
-            <a:off x="683568" y="908720"/>
-            <a:ext cx="7848872" cy="2031325"/>
+            <a:off x="683568" y="1772816"/>
+            <a:ext cx="7848872" cy="1477328"/>
           </a:xfrm>
           <a:prstGeom prst="rect">
             <a:avLst/>
@@ -3145,13 +3905,29 @@
           <a:lstStyle/>
           <a:p>
             <a:pPr algn="ctr"/>
+            <a:endParaRPr lang="fr-FR" u="sng" dirty="0" smtClean="0">
+              <a:solidFill>
+                <a:schemeClr val="tx1"/>
+              </a:solidFill>
+            </a:endParaRPr>
+          </a:p>
+          <a:p>
+            <a:pPr algn="ctr"/>
             <a:r>
               <a:rPr lang="fr-FR" u="sng" dirty="0" smtClean="0">
                 <a:solidFill>
                   <a:schemeClr val="tx1"/>
                 </a:solidFill>
               </a:rPr>
-              <a:t>RECONNAISSANCE DES PIONS AVEC LE </a:t>
+              <a:t>RECONNAISSANCE </a:t>
+            </a:r>
+            <a:r>
+              <a:rPr lang="fr-FR" u="sng" dirty="0" smtClean="0">
+                <a:solidFill>
+                  <a:schemeClr val="tx1"/>
+                </a:solidFill>
+              </a:rPr>
+              <a:t>DES PIONS AVEC LE </a:t>
             </a:r>
             <a:r>
               <a:rPr lang="fr-FR" b="1" u="sng" dirty="0" smtClean="0">
@@ -3159,39 +3935,66 @@
                   <a:schemeClr val="tx1"/>
                 </a:solidFill>
               </a:rPr>
-              <a:t>PROTO N°1</a:t>
-            </a:r>
-          </a:p>
-          <a:p>
-            <a:r>
-              <a:rPr lang="fr-FR" dirty="0" smtClean="0">
+              <a:t>PROTO </a:t>
+            </a:r>
+            <a:r>
+              <a:rPr lang="fr-FR" b="1" u="sng" dirty="0" smtClean="0">
                 <a:solidFill>
                   <a:schemeClr val="tx1"/>
                 </a:solidFill>
               </a:rPr>
-              <a:t>Reconnaitre la forme et la couleur sur les pions, leur positionnement les uns par rapport aux autres, pour différentes positions de la caméra par rapport aux pions </a:t>
-            </a:r>
-          </a:p>
-          <a:p>
-            <a:r>
-              <a:rPr lang="fr-FR" dirty="0" smtClean="0">
+              <a:t>N°1</a:t>
+            </a:r>
+          </a:p>
+          <a:p>
+            <a:pPr algn="ctr"/>
+            <a:r>
+              <a:rPr lang="fr-FR" u="sng" dirty="0" smtClean="0">
                 <a:solidFill>
                   <a:schemeClr val="tx1"/>
                 </a:solidFill>
               </a:rPr>
-              <a:t>Créer puis mettre à jour une grille représentant les pions, avec forme et couleur, posés sur la table de jeu</a:t>
-            </a:r>
-          </a:p>
-          <a:p>
-            <a:r>
-              <a:rPr lang="fr-FR" dirty="0" smtClean="0">
+              <a:t>REGLAGE ANGULAIRE DE L’AXE DE VISEE DE LA CAMERA AVEC LE </a:t>
+            </a:r>
+            <a:r>
+              <a:rPr lang="fr-FR" b="1" u="sng" dirty="0" smtClean="0">
                 <a:solidFill>
                   <a:schemeClr val="tx1"/>
                 </a:solidFill>
               </a:rPr>
-              <a:t>Afficher en temps réel, l’image traitée, la grille mise à jour, les conditions de l’essai, la date et l’heure</a:t>
-            </a:r>
-            <a:endParaRPr lang="fr-FR" dirty="0">
+              <a:t>PROTO </a:t>
+            </a:r>
+            <a:r>
+              <a:rPr lang="fr-FR" b="1" u="sng" dirty="0" smtClean="0">
+                <a:solidFill>
+                  <a:schemeClr val="tx1"/>
+                </a:solidFill>
+              </a:rPr>
+              <a:t>N°2</a:t>
+            </a:r>
+          </a:p>
+          <a:p>
+            <a:pPr algn="ctr"/>
+            <a:r>
+              <a:rPr lang="fr-FR" u="sng" dirty="0" smtClean="0">
+                <a:solidFill>
+                  <a:schemeClr val="tx1"/>
+                </a:solidFill>
+              </a:rPr>
+              <a:t>AFFICHAGE DES IMAGES ET DE LA GESTION DE  LA PARTIE AVEC LE </a:t>
+            </a:r>
+            <a:r>
+              <a:rPr lang="fr-FR" b="1" u="sng" dirty="0" smtClean="0">
+                <a:solidFill>
+                  <a:schemeClr val="tx1"/>
+                </a:solidFill>
+              </a:rPr>
+              <a:t>PROTO N°3</a:t>
+            </a:r>
+          </a:p>
+          <a:p>
+            <a:pPr algn="ctr"/>
+            <a:endParaRPr lang="fr-FR" b="1" u="sng" dirty="0" smtClean="0">
               <a:solidFill>
                 <a:schemeClr val="tx1"/>
               </a:solidFill>
@@ -3201,114 +4004,275 @@
       </p:sp>
       <p:sp>
         <p:nvSpPr>
-          <p:cNvPr id="5" name="ZoneTexte 4"/>
-          <p:cNvSpPr txBox="1"/>
+          <p:cNvPr id="6" name="Espace réservé du numéro de diapositive 5"/>
+          <p:cNvSpPr>
+            <a:spLocks noGrp="1"/>
+          </p:cNvSpPr>
+          <p:nvPr>
+            <p:ph type="sldNum" sz="quarter" idx="12"/>
+          </p:nvPr>
+        </p:nvSpPr>
+        <p:spPr/>
+        <p:txBody>
+          <a:bodyPr/>
+          <a:lstStyle/>
+          <a:p>
+            <a:fld id="{1B556100-060F-4735-9BD8-A816D0C09B57}" type="slidenum">
+              <a:rPr lang="fr-FR" smtClean="0"/>
+              <a:pPr/>
+              <a:t>1</a:t>
+            </a:fld>
+            <a:endParaRPr lang="fr-FR"/>
+          </a:p>
+        </p:txBody>
+      </p:sp>
+      <p:graphicFrame>
+        <p:nvGraphicFramePr>
+          <p:cNvPr id="8" name="Tableau 7"/>
+          <p:cNvGraphicFramePr>
+            <a:graphicFrameLocks noGrp="1"/>
+          </p:cNvGraphicFramePr>
           <p:nvPr/>
-        </p:nvSpPr>
-        <p:spPr>
-          <a:xfrm>
-            <a:off x="395536" y="3164681"/>
-            <a:ext cx="8568952" cy="3693319"/>
-          </a:xfrm>
-          <a:prstGeom prst="rect">
-            <a:avLst/>
-          </a:prstGeom>
-          <a:noFill/>
-        </p:spPr>
-        <p:txBody>
-          <a:bodyPr wrap="square" rtlCol="0">
-            <a:spAutoFit/>
-          </a:bodyPr>
-          <a:lstStyle/>
-          <a:p>
-            <a:pPr algn="ctr"/>
-            <a:r>
-              <a:rPr lang="fr-FR" b="1" dirty="0" smtClean="0"/>
-              <a:t>POUR POUVOIR EFFECTUER CES VALIDATIONS, IL FAUT:</a:t>
-            </a:r>
-          </a:p>
-          <a:p>
-            <a:r>
-              <a:rPr lang="fr-FR" dirty="0" smtClean="0"/>
-              <a:t>-  </a:t>
-            </a:r>
-            <a:r>
-              <a:rPr lang="fr-FR" u="sng" dirty="0" smtClean="0"/>
-              <a:t>La caméra: </a:t>
-            </a:r>
-            <a:r>
-              <a:rPr lang="fr-FR" dirty="0" smtClean="0"/>
-              <a:t>elle est positionnée manuellement par rapport aux pions: pas besoin d’OT de pointage caméra.</a:t>
-            </a:r>
-          </a:p>
-          <a:p>
-            <a:pPr>
-              <a:buFontTx/>
-              <a:buChar char="-"/>
-            </a:pPr>
-            <a:r>
-              <a:rPr lang="fr-FR" dirty="0" smtClean="0"/>
-              <a:t>  Les fonctionnalités de </a:t>
-            </a:r>
-            <a:r>
-              <a:rPr lang="fr-FR" u="sng" dirty="0" smtClean="0"/>
-              <a:t>l’ESP32 CAM (proto n°1) </a:t>
-            </a:r>
-            <a:r>
-              <a:rPr lang="fr-FR" dirty="0" smtClean="0"/>
-              <a:t>se limitent à la </a:t>
-            </a:r>
-            <a:r>
-              <a:rPr lang="fr-FR" dirty="0" err="1" smtClean="0"/>
-              <a:t>MeO</a:t>
-            </a:r>
-            <a:r>
-              <a:rPr lang="fr-FR" dirty="0" smtClean="0"/>
-              <a:t> de la caméra après reset manuel du contrôleur, au traitement de 10 images prélevées à 1 image/s à partir de 5s après l’activation de la caméra. Le traitement de chaque image inclue l’envoi à l’OT d’affichage, de l’image brute traitée et de la grille mise à jour associée.</a:t>
-            </a:r>
-          </a:p>
-          <a:p>
-            <a:pPr>
-              <a:buFontTx/>
-              <a:buChar char="-"/>
-            </a:pPr>
-            <a:r>
-              <a:rPr lang="fr-FR" dirty="0" smtClean="0"/>
-              <a:t>  </a:t>
-            </a:r>
-            <a:r>
-              <a:rPr lang="fr-FR" u="sng" dirty="0" smtClean="0"/>
-              <a:t>L’OT d’affichage</a:t>
-            </a:r>
-            <a:r>
-              <a:rPr lang="fr-FR" dirty="0" smtClean="0"/>
-              <a:t>: un PC qui commence par acquérir et afficher les conditions de l’essai qui va démarrer et ensuite allume un voyant vert pour indiquer qu’il est prêt à recevoir une séquence de 10 images. Chaque image est ensuite enregistrée par le PC pour pouvoir ensuite être revisualisée ou utilisée pour effectuer des MauP d’</a:t>
-            </a:r>
-            <a:r>
-              <a:rPr lang="fr-FR" dirty="0" err="1" smtClean="0"/>
-              <a:t>algo</a:t>
-            </a:r>
-            <a:endParaRPr lang="fr-FR" dirty="0" smtClean="0"/>
-          </a:p>
-          <a:p>
-            <a:pPr>
-              <a:buFontTx/>
-              <a:buChar char="-"/>
-            </a:pPr>
-            <a:r>
-              <a:rPr lang="fr-FR" dirty="0" smtClean="0"/>
-              <a:t>  </a:t>
-            </a:r>
-            <a:r>
-              <a:rPr lang="fr-FR" u="sng" dirty="0" smtClean="0"/>
-              <a:t>un jeu de pions </a:t>
-            </a:r>
-          </a:p>
-          <a:p>
-            <a:endParaRPr lang="fr-FR" dirty="0"/>
-          </a:p>
-        </p:txBody>
-      </p:sp>
+        </p:nvGraphicFramePr>
+        <p:xfrm>
+          <a:off x="1475656" y="3789040"/>
+          <a:ext cx="6264696" cy="2253848"/>
+        </p:xfrm>
+        <a:graphic>
+          <a:graphicData uri="http://schemas.openxmlformats.org/drawingml/2006/table">
+            <a:tbl>
+              <a:tblPr firstRow="1" bandRow="1">
+                <a:tableStyleId>{5C22544A-7EE6-4342-B048-85BDC9FD1C3A}</a:tableStyleId>
+              </a:tblPr>
+              <a:tblGrid>
+                <a:gridCol w="666006"/>
+                <a:gridCol w="4374554"/>
+                <a:gridCol w="1224136"/>
+              </a:tblGrid>
+              <a:tr h="370840">
+                <a:tc>
+                  <a:txBody>
+                    <a:bodyPr/>
+                    <a:lstStyle/>
+                    <a:p>
+                      <a:r>
+                        <a:rPr lang="fr-FR" b="0" dirty="0" smtClean="0"/>
+                        <a:t>Ed00</a:t>
+                      </a:r>
+                      <a:endParaRPr lang="fr-FR" b="0" dirty="0"/>
+                    </a:p>
+                  </a:txBody>
+                  <a:tcPr/>
+                </a:tc>
+                <a:tc>
+                  <a:txBody>
+                    <a:bodyPr/>
+                    <a:lstStyle/>
+                    <a:p>
+                      <a:r>
+                        <a:rPr lang="fr-FR" b="0" dirty="0" smtClean="0"/>
+                        <a:t>Edition</a:t>
+                      </a:r>
+                      <a:r>
+                        <a:rPr lang="fr-FR" b="0" baseline="0" dirty="0" smtClean="0"/>
+                        <a:t> originale</a:t>
+                      </a:r>
+                      <a:endParaRPr lang="fr-FR" b="0" dirty="0"/>
+                    </a:p>
+                  </a:txBody>
+                  <a:tcPr/>
+                </a:tc>
+                <a:tc>
+                  <a:txBody>
+                    <a:bodyPr/>
+                    <a:lstStyle/>
+                    <a:p>
+                      <a:r>
+                        <a:rPr lang="fr-FR" b="0" dirty="0" smtClean="0"/>
+                        <a:t>22/11/22</a:t>
+                      </a:r>
+                      <a:endParaRPr lang="fr-FR" b="0" dirty="0"/>
+                    </a:p>
+                  </a:txBody>
+                  <a:tcPr/>
+                </a:tc>
+              </a:tr>
+              <a:tr h="370840">
+                <a:tc>
+                  <a:txBody>
+                    <a:bodyPr/>
+                    <a:lstStyle/>
+                    <a:p>
+                      <a:r>
+                        <a:rPr lang="fr-FR" b="0" dirty="0" smtClean="0"/>
+                        <a:t>Ed01</a:t>
+                      </a:r>
+                      <a:endParaRPr lang="fr-FR" b="0" dirty="0"/>
+                    </a:p>
+                  </a:txBody>
+                  <a:tcPr/>
+                </a:tc>
+                <a:tc>
+                  <a:txBody>
+                    <a:bodyPr/>
+                    <a:lstStyle/>
+                    <a:p>
+                      <a:r>
+                        <a:rPr lang="fr-FR" b="0" dirty="0" smtClean="0"/>
+                        <a:t>Ajout glossaire et pagination</a:t>
+                      </a:r>
+                      <a:endParaRPr lang="fr-FR" b="0" dirty="0"/>
+                    </a:p>
+                  </a:txBody>
+                  <a:tcPr/>
+                </a:tc>
+                <a:tc>
+                  <a:txBody>
+                    <a:bodyPr/>
+                    <a:lstStyle/>
+                    <a:p>
+                      <a:r>
+                        <a:rPr lang="fr-FR" b="0" dirty="0" smtClean="0"/>
+                        <a:t>23/11/22</a:t>
+                      </a:r>
+                      <a:endParaRPr lang="fr-FR" b="0" dirty="0"/>
+                    </a:p>
+                  </a:txBody>
+                  <a:tcPr/>
+                </a:tc>
+              </a:tr>
+              <a:tr h="370840">
+                <a:tc>
+                  <a:txBody>
+                    <a:bodyPr/>
+                    <a:lstStyle/>
+                    <a:p>
+                      <a:endParaRPr lang="fr-FR" b="0"/>
+                    </a:p>
+                  </a:txBody>
+                  <a:tcPr/>
+                </a:tc>
+                <a:tc>
+                  <a:txBody>
+                    <a:bodyPr/>
+                    <a:lstStyle/>
+                    <a:p>
+                      <a:endParaRPr lang="fr-FR" b="0"/>
+                    </a:p>
+                  </a:txBody>
+                  <a:tcPr/>
+                </a:tc>
+                <a:tc>
+                  <a:txBody>
+                    <a:bodyPr/>
+                    <a:lstStyle/>
+                    <a:p>
+                      <a:endParaRPr lang="fr-FR" b="0"/>
+                    </a:p>
+                  </a:txBody>
+                  <a:tcPr/>
+                </a:tc>
+              </a:tr>
+              <a:tr h="399648">
+                <a:tc>
+                  <a:txBody>
+                    <a:bodyPr/>
+                    <a:lstStyle/>
+                    <a:p>
+                      <a:endParaRPr lang="fr-FR" b="0"/>
+                    </a:p>
+                  </a:txBody>
+                  <a:tcPr/>
+                </a:tc>
+                <a:tc>
+                  <a:txBody>
+                    <a:bodyPr/>
+                    <a:lstStyle/>
+                    <a:p>
+                      <a:endParaRPr lang="fr-FR" b="0"/>
+                    </a:p>
+                  </a:txBody>
+                  <a:tcPr/>
+                </a:tc>
+                <a:tc>
+                  <a:txBody>
+                    <a:bodyPr/>
+                    <a:lstStyle/>
+                    <a:p>
+                      <a:endParaRPr lang="fr-FR" b="0"/>
+                    </a:p>
+                  </a:txBody>
+                  <a:tcPr/>
+                </a:tc>
+              </a:tr>
+              <a:tr h="370840">
+                <a:tc>
+                  <a:txBody>
+                    <a:bodyPr/>
+                    <a:lstStyle/>
+                    <a:p>
+                      <a:endParaRPr lang="fr-FR" b="0"/>
+                    </a:p>
+                  </a:txBody>
+                  <a:tcPr/>
+                </a:tc>
+                <a:tc>
+                  <a:txBody>
+                    <a:bodyPr/>
+                    <a:lstStyle/>
+                    <a:p>
+                      <a:endParaRPr lang="fr-FR" b="0"/>
+                    </a:p>
+                  </a:txBody>
+                  <a:tcPr/>
+                </a:tc>
+                <a:tc>
+                  <a:txBody>
+                    <a:bodyPr/>
+                    <a:lstStyle/>
+                    <a:p>
+                      <a:endParaRPr lang="fr-FR" b="0"/>
+                    </a:p>
+                  </a:txBody>
+                  <a:tcPr/>
+                </a:tc>
+              </a:tr>
+              <a:tr h="370840">
+                <a:tc>
+                  <a:txBody>
+                    <a:bodyPr/>
+                    <a:lstStyle/>
+                    <a:p>
+                      <a:endParaRPr lang="fr-FR" b="0"/>
+                    </a:p>
+                  </a:txBody>
+                  <a:tcPr/>
+                </a:tc>
+                <a:tc>
+                  <a:txBody>
+                    <a:bodyPr/>
+                    <a:lstStyle/>
+                    <a:p>
+                      <a:endParaRPr lang="fr-FR" b="0"/>
+                    </a:p>
+                  </a:txBody>
+                  <a:tcPr/>
+                </a:tc>
+                <a:tc>
+                  <a:txBody>
+                    <a:bodyPr/>
+                    <a:lstStyle/>
+                    <a:p>
+                      <a:endParaRPr lang="fr-FR" b="0" dirty="0"/>
+                    </a:p>
+                  </a:txBody>
+                  <a:tcPr/>
+                </a:tc>
+              </a:tr>
+            </a:tbl>
+          </a:graphicData>
+        </a:graphic>
+      </p:graphicFrame>
     </p:spTree>
   </p:cSld>
   <p:clrMapOvr>
@@ -3341,13 +4305,13 @@
             <a:spLocks noGrp="1"/>
           </p:cNvSpPr>
           <p:nvPr>
-            <p:ph type="title"/>
+            <p:ph type="ctrTitle"/>
           </p:nvPr>
         </p:nvSpPr>
         <p:spPr>
           <a:xfrm>
-            <a:off x="457200" y="274638"/>
-            <a:ext cx="8229600" cy="778098"/>
+            <a:off x="611560" y="332656"/>
+            <a:ext cx="7772400" cy="648072"/>
           </a:xfrm>
         </p:spPr>
         <p:txBody>
@@ -3366,106 +4330,149 @@
       </p:sp>
       <p:sp>
         <p:nvSpPr>
-          <p:cNvPr id="4" name="Espace réservé du contenu 3"/>
-          <p:cNvSpPr txBox="1">
-            <a:spLocks noGrp="1"/>
-          </p:cNvSpPr>
-          <p:nvPr>
-            <p:ph idx="1"/>
-          </p:nvPr>
+          <p:cNvPr id="4" name="ZoneTexte 3"/>
+          <p:cNvSpPr txBox="1"/>
+          <p:nvPr/>
         </p:nvSpPr>
         <p:spPr>
           <a:xfrm>
-            <a:off x="467544" y="1052736"/>
-            <a:ext cx="8229600" cy="4358116"/>
+            <a:off x="683568" y="1772816"/>
+            <a:ext cx="7848872" cy="2862322"/>
           </a:xfrm>
           <a:prstGeom prst="rect">
             <a:avLst/>
           </a:prstGeom>
-          <a:noFill/>
         </p:spPr>
+        <p:style>
+          <a:lnRef idx="2">
+            <a:schemeClr val="dk1"/>
+          </a:lnRef>
+          <a:fillRef idx="1">
+            <a:schemeClr val="lt1"/>
+          </a:fillRef>
+          <a:effectRef idx="0">
+            <a:schemeClr val="dk1"/>
+          </a:effectRef>
+          <a:fontRef idx="minor">
+            <a:schemeClr val="dk1"/>
+          </a:fontRef>
+        </p:style>
         <p:txBody>
           <a:bodyPr wrap="square" rtlCol="0">
             <a:spAutoFit/>
           </a:bodyPr>
           <a:lstStyle/>
           <a:p>
-            <a:pPr algn="ctr"/>
-            <a:r>
-              <a:rPr lang="fr-FR" sz="1800" b="1" dirty="0" smtClean="0"/>
-              <a:t>CES VALIDATIONS PERMETTRONT:</a:t>
-            </a:r>
-          </a:p>
-          <a:p>
-            <a:pPr>
-              <a:buFontTx/>
-              <a:buChar char="-"/>
-            </a:pPr>
-            <a:r>
-              <a:rPr lang="fr-FR" sz="1800" dirty="0" smtClean="0"/>
-              <a:t>De vérifier le champs de la caméra et de préciser son besoin de positionnement par rapport aux pions sur la table: altitude, angle de visée fixe ou mobile, positionnement du mat support caméra fixe ou mobile</a:t>
-            </a:r>
-          </a:p>
-          <a:p>
-            <a:pPr>
-              <a:buFontTx/>
-              <a:buChar char="-"/>
-            </a:pPr>
-            <a:r>
-              <a:rPr lang="fr-FR" sz="1800" dirty="0" smtClean="0"/>
-              <a:t>De définir comment le TI s’assurera qu’il voit la totalité des pions posés</a:t>
-            </a:r>
-          </a:p>
-          <a:p>
-            <a:pPr>
-              <a:buFontTx/>
-              <a:buChar char="-"/>
-            </a:pPr>
-            <a:r>
-              <a:rPr lang="fr-FR" sz="1800" dirty="0" smtClean="0"/>
-              <a:t>De définir comment le TI règlera le positionnement et l’axe de visée de la caméra en cas de besoin</a:t>
-            </a:r>
-          </a:p>
-          <a:p>
-            <a:pPr>
-              <a:buFontTx/>
-              <a:buChar char="-"/>
-            </a:pPr>
-            <a:r>
-              <a:rPr lang="fr-FR" sz="1800" dirty="0" smtClean="0"/>
-              <a:t>De préciser la définition du système de positionnement et  de pointage de la caméra sur son support (mat fixe ou mobile, pont roulant ou mat, axe de visée fixe ou mobile)</a:t>
-            </a:r>
-          </a:p>
-          <a:p>
-            <a:pPr>
-              <a:buFontTx/>
-              <a:buChar char="-"/>
-            </a:pPr>
-            <a:r>
-              <a:rPr lang="fr-FR" sz="1800" dirty="0" smtClean="0"/>
-              <a:t>D’adopter définitivement un plan de pose uniforme et plan</a:t>
-            </a:r>
-          </a:p>
-          <a:p>
-            <a:pPr>
-              <a:buFontTx/>
-              <a:buChar char="-"/>
-            </a:pPr>
-            <a:r>
-              <a:rPr lang="fr-FR" sz="1800" dirty="0" smtClean="0"/>
-              <a:t>De valider les algos de traitement d’image implantés dans le proto en essais (proto n°1)</a:t>
-            </a:r>
-          </a:p>
-          <a:p>
-            <a:pPr>
-              <a:buFontTx/>
-              <a:buChar char="-"/>
-            </a:pPr>
-            <a:r>
-              <a:rPr lang="fr-FR" sz="1800" dirty="0" smtClean="0"/>
-              <a:t>De préciser la définition du système d’affichage et de gestion du jeu futur</a:t>
-            </a:r>
-            <a:endParaRPr lang="fr-FR" dirty="0"/>
+            <a:endParaRPr lang="fr-FR" u="sng" dirty="0" smtClean="0">
+              <a:solidFill>
+                <a:schemeClr val="tx1"/>
+              </a:solidFill>
+            </a:endParaRPr>
+          </a:p>
+          <a:p>
+            <a:r>
+              <a:rPr lang="fr-FR" dirty="0" smtClean="0">
+                <a:solidFill>
+                  <a:schemeClr val="tx1"/>
+                </a:solidFill>
+              </a:rPr>
+              <a:t>BF:		Bon Fonctionnement</a:t>
+            </a:r>
+          </a:p>
+          <a:p>
+            <a:r>
+              <a:rPr lang="fr-FR" dirty="0" smtClean="0">
+                <a:solidFill>
+                  <a:schemeClr val="tx1"/>
+                </a:solidFill>
+              </a:rPr>
+              <a:t>MauP:		Mise au point</a:t>
+            </a:r>
+          </a:p>
+          <a:p>
+            <a:r>
+              <a:rPr lang="fr-FR" dirty="0" smtClean="0">
+                <a:solidFill>
+                  <a:schemeClr val="tx1"/>
+                </a:solidFill>
+              </a:rPr>
+              <a:t>MeO:		Mise en Œuvre</a:t>
+            </a:r>
+          </a:p>
+          <a:p>
+            <a:r>
+              <a:rPr lang="fr-FR" dirty="0" smtClean="0">
+                <a:solidFill>
+                  <a:schemeClr val="tx1"/>
+                </a:solidFill>
+              </a:rPr>
+              <a:t>OT:		Outillage</a:t>
+            </a:r>
+          </a:p>
+          <a:p>
+            <a:r>
+              <a:rPr lang="fr-FR" dirty="0" smtClean="0">
+                <a:solidFill>
+                  <a:schemeClr val="tx1"/>
+                </a:solidFill>
+              </a:rPr>
+              <a:t>TI:		Traitement d’Image</a:t>
+            </a:r>
+          </a:p>
+          <a:p>
+            <a:r>
+              <a:rPr lang="fr-FR" dirty="0" smtClean="0">
+                <a:solidFill>
+                  <a:schemeClr val="tx1"/>
+                </a:solidFill>
+              </a:rPr>
+              <a:t>VBF:		Vérification du Bon Fonctionnement</a:t>
+            </a:r>
+          </a:p>
+          <a:p>
+            <a:endParaRPr lang="fr-FR" dirty="0" smtClean="0">
+              <a:solidFill>
+                <a:schemeClr val="tx1"/>
+              </a:solidFill>
+            </a:endParaRPr>
+          </a:p>
+          <a:p>
+            <a:endParaRPr lang="fr-FR" dirty="0" smtClean="0">
+              <a:solidFill>
+                <a:schemeClr val="tx1"/>
+              </a:solidFill>
+            </a:endParaRPr>
+          </a:p>
+          <a:p>
+            <a:endParaRPr lang="fr-FR" dirty="0" smtClean="0">
+              <a:solidFill>
+                <a:schemeClr val="tx1"/>
+              </a:solidFill>
+            </a:endParaRPr>
+          </a:p>
+        </p:txBody>
+      </p:sp>
+      <p:sp>
+        <p:nvSpPr>
+          <p:cNvPr id="6" name="Espace réservé du numéro de diapositive 5"/>
+          <p:cNvSpPr>
+            <a:spLocks noGrp="1"/>
+          </p:cNvSpPr>
+          <p:nvPr>
+            <p:ph type="sldNum" sz="quarter" idx="12"/>
+          </p:nvPr>
+        </p:nvSpPr>
+        <p:spPr/>
+        <p:txBody>
+          <a:bodyPr/>
+          <a:lstStyle/>
+          <a:p>
+            <a:fld id="{1B556100-060F-4735-9BD8-A816D0C09B57}" type="slidenum">
+              <a:rPr lang="fr-FR" smtClean="0"/>
+              <a:pPr/>
+              <a:t>2</a:t>
+            </a:fld>
+            <a:endParaRPr lang="fr-FR"/>
           </a:p>
         </p:txBody>
       </p:sp>
@@ -3533,7 +4540,7 @@
         <p:spPr>
           <a:xfrm>
             <a:off x="683568" y="908720"/>
-            <a:ext cx="7848872" cy="1200329"/>
+            <a:ext cx="7848872" cy="2031325"/>
           </a:xfrm>
           <a:prstGeom prst="rect">
             <a:avLst/>
@@ -3566,7 +4573,7 @@
                   <a:schemeClr val="tx1"/>
                 </a:solidFill>
               </a:rPr>
-              <a:t>REGLAGE ANGULAIRE DE L’AXE DE VISEE DE LA CAMERA AVEC LE </a:t>
+              <a:t>RECONNAISSANCE DES PIONS AVEC LE </a:t>
             </a:r>
             <a:r>
               <a:rPr lang="fr-FR" b="1" u="sng" dirty="0" smtClean="0">
@@ -3574,7 +4581,7 @@
                   <a:schemeClr val="tx1"/>
                 </a:solidFill>
               </a:rPr>
-              <a:t>PROTO N°2</a:t>
+              <a:t>PROTO N°1</a:t>
             </a:r>
           </a:p>
           <a:p>
@@ -3584,7 +4591,7 @@
                   <a:schemeClr val="tx1"/>
                 </a:solidFill>
               </a:rPr>
-              <a:t>Mettre en œuvre le système d’orientation de l’axe de visée de la caméra  via des commandes envoyées par un  ESP32 CAM monté sur son shield (proto 2)</a:t>
+              <a:t>Reconnaitre la forme et la couleur sur les pions, leur positionnement les uns par rapport aux autres, pour différentes positions de la caméra par rapport aux pions </a:t>
             </a:r>
           </a:p>
           <a:p>
@@ -3594,7 +4601,17 @@
                   <a:schemeClr val="tx1"/>
                 </a:solidFill>
               </a:rPr>
-              <a:t>Afficher l’image générée en temps réel, sur un PC (via la liaison USB du shield?)</a:t>
+              <a:t>Créer puis mettre à jour une grille représentant les pions, avec forme et couleur, posés sur la table de jeu</a:t>
+            </a:r>
+          </a:p>
+          <a:p>
+            <a:r>
+              <a:rPr lang="fr-FR" dirty="0" smtClean="0">
+                <a:solidFill>
+                  <a:schemeClr val="tx1"/>
+                </a:solidFill>
+              </a:rPr>
+              <a:t>Afficher en temps réel, l’image traitée, la grille mise à jour, les conditions de l’essai, la date et l’heure</a:t>
             </a:r>
             <a:endParaRPr lang="fr-FR" dirty="0">
               <a:solidFill>
@@ -3612,8 +4629,8 @@
         </p:nvSpPr>
         <p:spPr>
           <a:xfrm>
-            <a:off x="323528" y="2420888"/>
-            <a:ext cx="8568952" cy="1754326"/>
+            <a:off x="395536" y="3164681"/>
+            <a:ext cx="8568952" cy="3693319"/>
           </a:xfrm>
           <a:prstGeom prst="rect">
             <a:avLst/>
@@ -3639,11 +4656,11 @@
             </a:r>
             <a:r>
               <a:rPr lang="fr-FR" u="sng" dirty="0" smtClean="0"/>
-              <a:t>Un ensemble ESP32 CAM</a:t>
+              <a:t>La caméra: </a:t>
             </a:r>
             <a:r>
               <a:rPr lang="fr-FR" dirty="0" smtClean="0"/>
-              <a:t>   dont la caméra est positionnée sur le système d’orientation fixé en haut d’un mat.</a:t>
+              <a:t>elle est positionnée manuellement par rapport aux pions: pas besoin d’OT de pointage caméra.</a:t>
             </a:r>
           </a:p>
           <a:p>
@@ -3653,15 +4670,15 @@
             </a:pPr>
             <a:r>
               <a:rPr lang="fr-FR" dirty="0" smtClean="0"/>
-              <a:t>  </a:t>
+              <a:t>  Les fonctionnalités de </a:t>
             </a:r>
             <a:r>
               <a:rPr lang="fr-FR" u="sng" dirty="0" smtClean="0"/>
-              <a:t>un PC outillage</a:t>
+              <a:t>l’ESP32 CAM (proto n°1) </a:t>
             </a:r>
             <a:r>
               <a:rPr lang="fr-FR" dirty="0" smtClean="0"/>
-              <a:t> pour afficher en direct les images créées.</a:t>
+              <a:t>se limitent à la MeO de la caméra après reset manuel du contrôleur, au traitement de 10 images prélevées à 1 image/s à partir de 5s après l’activation de la caméra. Le traitement de chaque image inclue l’envoi à l’OT d’affichage, de l’image brute traitée et de la grille mise à jour associée.</a:t>
             </a:r>
           </a:p>
           <a:p>
@@ -3671,8 +4688,21 @@
             </a:pPr>
             <a:r>
               <a:rPr lang="fr-FR" dirty="0" smtClean="0"/>
-              <a:t>  ces validations sont indépendantes des essais sur le proto n°1</a:t>
-            </a:r>
+              <a:t>  </a:t>
+            </a:r>
+            <a:r>
+              <a:rPr lang="fr-FR" u="sng" dirty="0" smtClean="0"/>
+              <a:t>L’OT d’affichage</a:t>
+            </a:r>
+            <a:r>
+              <a:rPr lang="fr-FR" dirty="0" smtClean="0"/>
+              <a:t>: un PC qui commence par acquérir et afficher les conditions de l’essai qui va démarrer et ensuite allume un voyant vert pour indiquer qu’il est prêt à recevoir une séquence de 10 images. Chaque image est ensuite enregistrée par le PC pour pouvoir ensuite être revisualisée ou utilisée pour effectuer des MauP d’</a:t>
+            </a:r>
+            <a:r>
+              <a:rPr lang="fr-FR" dirty="0" err="1" smtClean="0"/>
+              <a:t>algo</a:t>
+            </a:r>
+            <a:endParaRPr lang="fr-FR" dirty="0" smtClean="0"/>
           </a:p>
           <a:p>
             <a:pPr>
@@ -3683,175 +4713,37 @@
               <a:rPr lang="fr-FR" dirty="0" smtClean="0"/>
               <a:t>  </a:t>
             </a:r>
+            <a:r>
+              <a:rPr lang="fr-FR" u="sng" dirty="0" smtClean="0"/>
+              <a:t>un jeu de pions </a:t>
+            </a:r>
+          </a:p>
+          <a:p>
             <a:endParaRPr lang="fr-FR" dirty="0"/>
           </a:p>
         </p:txBody>
       </p:sp>
       <p:sp>
         <p:nvSpPr>
-          <p:cNvPr id="6" name="Espace réservé du contenu 3"/>
-          <p:cNvSpPr txBox="1">
-            <a:spLocks/>
-          </p:cNvSpPr>
-          <p:nvPr/>
-        </p:nvSpPr>
-        <p:spPr>
-          <a:xfrm>
-            <a:off x="395536" y="4309610"/>
-            <a:ext cx="8229600" cy="1366528"/>
-          </a:xfrm>
-          <a:prstGeom prst="rect">
-            <a:avLst/>
-          </a:prstGeom>
-          <a:noFill/>
-        </p:spPr>
-        <p:txBody>
-          <a:bodyPr vert="horz" wrap="square" lIns="91440" tIns="45720" rIns="91440" bIns="45720" rtlCol="0">
-            <a:spAutoFit/>
-          </a:bodyPr>
-          <a:lstStyle/>
-          <a:p>
-            <a:pPr marL="0" marR="0" lvl="0" indent="0" algn="ctr" defTabSz="914400" rtl="0" eaLnBrk="1" fontAlgn="auto" latinLnBrk="0" hangingPunct="1">
-              <a:lnSpc>
-                <a:spcPct val="100000"/>
-              </a:lnSpc>
-              <a:spcBef>
-                <a:spcPct val="20000"/>
-              </a:spcBef>
-              <a:spcAft>
-                <a:spcPts val="0"/>
-              </a:spcAft>
-              <a:buClrTx/>
-              <a:buSzTx/>
-              <a:buFont typeface="Arial" pitchFamily="34" charset="0"/>
-              <a:buNone/>
-              <a:tabLst/>
-              <a:defRPr/>
-            </a:pPr>
-            <a:r>
-              <a:rPr kumimoji="0" lang="fr-FR" sz="1800" b="1" i="0" u="none" strike="noStrike" kern="1200" cap="none" spc="0" normalizeH="0" baseline="0" noProof="0" dirty="0" smtClean="0">
-                <a:ln>
-                  <a:noFill/>
-                </a:ln>
-                <a:effectLst/>
-                <a:uLnTx/>
-                <a:uFillTx/>
-                <a:latin typeface="+mn-lt"/>
-                <a:ea typeface="+mn-ea"/>
-                <a:cs typeface="+mn-cs"/>
-              </a:rPr>
-              <a:t>CES VALIDATIONS PERMETTRONT:</a:t>
-            </a:r>
-          </a:p>
-          <a:p>
-            <a:pPr marL="0" marR="0" lvl="0" indent="0" defTabSz="914400" rtl="0" eaLnBrk="1" fontAlgn="auto" latinLnBrk="0" hangingPunct="1">
-              <a:lnSpc>
-                <a:spcPct val="100000"/>
-              </a:lnSpc>
-              <a:spcBef>
-                <a:spcPct val="20000"/>
-              </a:spcBef>
-              <a:spcAft>
-                <a:spcPts val="0"/>
-              </a:spcAft>
-              <a:buClrTx/>
-              <a:buSzTx/>
-              <a:buFontTx/>
-              <a:buChar char="-"/>
-              <a:tabLst/>
-              <a:defRPr/>
-            </a:pPr>
-            <a:r>
-              <a:rPr kumimoji="0" lang="fr-FR" sz="1800" b="0" i="0" u="none" strike="noStrike" kern="1200" cap="none" spc="0" normalizeH="0" baseline="0" noProof="0" dirty="0" smtClean="0">
-                <a:ln>
-                  <a:noFill/>
-                </a:ln>
-                <a:effectLst/>
-                <a:uLnTx/>
-                <a:uFillTx/>
-                <a:latin typeface="+mn-lt"/>
-                <a:ea typeface="+mn-ea"/>
-                <a:cs typeface="+mn-cs"/>
-              </a:rPr>
-              <a:t>  de vérifier le BF du pointage en site et gisement de l’axe de visée de la caméra</a:t>
-            </a:r>
-          </a:p>
-          <a:p>
-            <a:pPr marL="0" marR="0" lvl="0" indent="0" defTabSz="914400" rtl="0" eaLnBrk="1" fontAlgn="auto" latinLnBrk="0" hangingPunct="1">
-              <a:lnSpc>
-                <a:spcPct val="100000"/>
-              </a:lnSpc>
-              <a:spcBef>
-                <a:spcPct val="20000"/>
-              </a:spcBef>
-              <a:spcAft>
-                <a:spcPts val="0"/>
-              </a:spcAft>
-              <a:buClrTx/>
-              <a:buSzTx/>
-              <a:buFontTx/>
-              <a:buChar char="-"/>
-              <a:tabLst/>
-              <a:defRPr/>
-            </a:pPr>
-            <a:r>
-              <a:rPr kumimoji="0" lang="fr-FR" sz="1800" b="0" i="0" u="none" strike="noStrike" kern="1200" cap="none" spc="0" normalizeH="0" baseline="0" noProof="0" dirty="0" smtClean="0">
-                <a:ln>
-                  <a:noFill/>
-                </a:ln>
-                <a:effectLst/>
-                <a:uLnTx/>
-                <a:uFillTx/>
-                <a:latin typeface="+mn-lt"/>
-                <a:ea typeface="+mn-ea"/>
-                <a:cs typeface="+mn-cs"/>
-              </a:rPr>
-              <a:t>  de vérifier que les angles commandés sont bien cohérents avec ceux réalisés</a:t>
-            </a:r>
-          </a:p>
-          <a:p>
-            <a:pPr marL="0" marR="0" lvl="0" indent="0" defTabSz="914400" rtl="0" eaLnBrk="1" fontAlgn="auto" latinLnBrk="0" hangingPunct="1">
-              <a:lnSpc>
-                <a:spcPct val="100000"/>
-              </a:lnSpc>
-              <a:spcBef>
-                <a:spcPct val="20000"/>
-              </a:spcBef>
-              <a:spcAft>
-                <a:spcPts val="0"/>
-              </a:spcAft>
-              <a:buClrTx/>
-              <a:buSzTx/>
-              <a:buFontTx/>
-              <a:buChar char="-"/>
-              <a:tabLst/>
-              <a:defRPr/>
-            </a:pPr>
-            <a:r>
-              <a:rPr kumimoji="0" lang="fr-FR" sz="1800" b="0" i="0" u="none" strike="noStrike" kern="1200" cap="none" spc="0" normalizeH="0" baseline="0" noProof="0" dirty="0" smtClean="0">
-                <a:ln>
-                  <a:noFill/>
-                </a:ln>
-                <a:effectLst/>
-                <a:uLnTx/>
-                <a:uFillTx/>
-                <a:latin typeface="+mn-lt"/>
-                <a:ea typeface="+mn-ea"/>
-                <a:cs typeface="+mn-cs"/>
-              </a:rPr>
-              <a:t>  de définir le champ de réglage angulaire en site et en gisement</a:t>
-            </a:r>
-            <a:endParaRPr kumimoji="0" lang="fr-FR" sz="3200" b="0" i="0" u="none" strike="noStrike" kern="1200" cap="none" spc="0" normalizeH="0" baseline="0" noProof="0" dirty="0" smtClean="0">
-              <a:ln>
-                <a:noFill/>
-              </a:ln>
-              <a:effectLst/>
-              <a:uLnTx/>
-              <a:uFillTx/>
-              <a:latin typeface="+mn-lt"/>
-              <a:ea typeface="+mn-ea"/>
-              <a:cs typeface="+mn-cs"/>
-            </a:endParaRPr>
+          <p:cNvPr id="6" name="Espace réservé du numéro de diapositive 5"/>
+          <p:cNvSpPr>
+            <a:spLocks noGrp="1"/>
+          </p:cNvSpPr>
+          <p:nvPr>
+            <p:ph type="sldNum" sz="quarter" idx="12"/>
+          </p:nvPr>
+        </p:nvSpPr>
+        <p:spPr/>
+        <p:txBody>
+          <a:bodyPr/>
+          <a:lstStyle/>
+          <a:p>
+            <a:fld id="{1B556100-060F-4735-9BD8-A816D0C09B57}" type="slidenum">
+              <a:rPr lang="fr-FR" smtClean="0"/>
+              <a:pPr/>
+              <a:t>3</a:t>
+            </a:fld>
+            <a:endParaRPr lang="fr-FR"/>
           </a:p>
         </p:txBody>
       </p:sp>
@@ -3887,13 +4779,13 @@
             <a:spLocks noGrp="1"/>
           </p:cNvSpPr>
           <p:nvPr>
-            <p:ph type="ctrTitle"/>
+            <p:ph type="title"/>
           </p:nvPr>
         </p:nvSpPr>
         <p:spPr>
           <a:xfrm>
-            <a:off x="611560" y="116632"/>
-            <a:ext cx="7772400" cy="648072"/>
+            <a:off x="457200" y="274638"/>
+            <a:ext cx="8229600" cy="778098"/>
           </a:xfrm>
         </p:spPr>
         <p:txBody>
@@ -3912,89 +4804,18 @@
       </p:sp>
       <p:sp>
         <p:nvSpPr>
-          <p:cNvPr id="4" name="ZoneTexte 3"/>
-          <p:cNvSpPr txBox="1"/>
-          <p:nvPr/>
+          <p:cNvPr id="4" name="Espace réservé du contenu 3"/>
+          <p:cNvSpPr txBox="1">
+            <a:spLocks noGrp="1"/>
+          </p:cNvSpPr>
+          <p:nvPr>
+            <p:ph idx="1"/>
+          </p:nvPr>
         </p:nvSpPr>
         <p:spPr>
           <a:xfrm>
-            <a:off x="683568" y="908720"/>
-            <a:ext cx="7848872" cy="1200329"/>
-          </a:xfrm>
-          <a:prstGeom prst="rect">
-            <a:avLst/>
-          </a:prstGeom>
-        </p:spPr>
-        <p:style>
-          <a:lnRef idx="2">
-            <a:schemeClr val="dk1"/>
-          </a:lnRef>
-          <a:fillRef idx="1">
-            <a:schemeClr val="lt1"/>
-          </a:fillRef>
-          <a:effectRef idx="0">
-            <a:schemeClr val="dk1"/>
-          </a:effectRef>
-          <a:fontRef idx="minor">
-            <a:schemeClr val="dk1"/>
-          </a:fontRef>
-        </p:style>
-        <p:txBody>
-          <a:bodyPr wrap="square" rtlCol="0">
-            <a:spAutoFit/>
-          </a:bodyPr>
-          <a:lstStyle/>
-          <a:p>
-            <a:pPr algn="ctr"/>
-            <a:r>
-              <a:rPr lang="fr-FR" u="sng" dirty="0" smtClean="0">
-                <a:solidFill>
-                  <a:schemeClr val="tx1"/>
-                </a:solidFill>
-              </a:rPr>
-              <a:t>AFFICHAGE DES IMAGES ET DE LA GESTION DE  LA PARTIE AVEC LE </a:t>
-            </a:r>
-            <a:r>
-              <a:rPr lang="fr-FR" b="1" u="sng" dirty="0" smtClean="0">
-                <a:solidFill>
-                  <a:schemeClr val="tx1"/>
-                </a:solidFill>
-              </a:rPr>
-              <a:t>PROTO N°3</a:t>
-            </a:r>
-          </a:p>
-          <a:p>
-            <a:r>
-              <a:rPr lang="fr-FR" dirty="0" smtClean="0">
-                <a:solidFill>
-                  <a:schemeClr val="tx1"/>
-                </a:solidFill>
-              </a:rPr>
-              <a:t>Valider l’affichage des infos de gestion de la partie (interaction avec les joueurs, score), l’affichage d’images et de grilles avec l’écran choisi</a:t>
-            </a:r>
-          </a:p>
-          <a:p>
-            <a:r>
-              <a:rPr lang="fr-FR" dirty="0" smtClean="0">
-                <a:solidFill>
-                  <a:schemeClr val="tx1"/>
-                </a:solidFill>
-              </a:rPr>
-              <a:t>Défi</a:t>
-            </a:r>
-          </a:p>
-        </p:txBody>
-      </p:sp>
-      <p:sp>
-        <p:nvSpPr>
-          <p:cNvPr id="7" name="ZoneTexte 6"/>
-          <p:cNvSpPr txBox="1"/>
-          <p:nvPr/>
-        </p:nvSpPr>
-        <p:spPr>
-          <a:xfrm>
-            <a:off x="323528" y="2420888"/>
-            <a:ext cx="8568952" cy="2031325"/>
+            <a:off x="467544" y="1052736"/>
+            <a:ext cx="8229600" cy="4358116"/>
           </a:xfrm>
           <a:prstGeom prst="rect">
             <a:avLst/>
@@ -4009,8 +4830,8 @@
           <a:p>
             <a:pPr algn="ctr"/>
             <a:r>
-              <a:rPr lang="fr-FR" b="1" dirty="0" smtClean="0"/>
-              <a:t>POUR POUVOIR EFFECTUER CES VALIDATIONS, IL FAUT:</a:t>
+              <a:rPr lang="fr-FR" sz="1800" b="1" dirty="0" smtClean="0"/>
+              <a:t>CES VALIDATIONS PERMETTRONT:</a:t>
             </a:r>
           </a:p>
           <a:p>
@@ -4019,16 +4840,8 @@
               <a:buChar char="-"/>
             </a:pPr>
             <a:r>
-              <a:rPr lang="fr-FR" dirty="0" smtClean="0"/>
-              <a:t>  </a:t>
-            </a:r>
-            <a:r>
-              <a:rPr lang="fr-FR" u="sng" dirty="0" smtClean="0"/>
-              <a:t>Un ensemble ESP32 CAM,</a:t>
-            </a:r>
-            <a:r>
-              <a:rPr lang="fr-FR" dirty="0" smtClean="0"/>
-              <a:t>   un outillage ou un PC pour générées les infos qui seront générées dans le futur par le l’ESP 32 CAM définitif (image caméra, grille, info « dépose correcte et conforme à la règle du jeu », info « au joueur suivant de jouer », le score mis à jour)  </a:t>
+              <a:rPr lang="fr-FR" sz="1800" dirty="0" smtClean="0"/>
+              <a:t>De vérifier le champs de la caméra et de préciser son besoin de positionnement par rapport aux pions sur la table: altitude, angle de visée fixe ou mobile, positionnement du mat support caméra fixe ou mobile</a:t>
             </a:r>
           </a:p>
           <a:p>
@@ -4037,8 +4850,8 @@
               <a:buChar char="-"/>
             </a:pPr>
             <a:r>
-              <a:rPr lang="fr-FR" dirty="0" smtClean="0"/>
-              <a:t>  ces validations seront menées mi-février 2023</a:t>
+              <a:rPr lang="fr-FR" sz="1800" dirty="0" smtClean="0"/>
+              <a:t>De définir comment le TI s’assurera qu’il voit la totalité des pions posés</a:t>
             </a:r>
           </a:p>
           <a:p>
@@ -4047,135 +4860,74 @@
               <a:buChar char="-"/>
             </a:pPr>
             <a:r>
-              <a:rPr lang="fr-FR" dirty="0" smtClean="0"/>
-              <a:t> si possible un système d’affichage retenu  </a:t>
-            </a:r>
-            <a:endParaRPr lang="fr-FR" dirty="0"/>
-          </a:p>
-        </p:txBody>
-      </p:sp>
-      <p:sp>
-        <p:nvSpPr>
-          <p:cNvPr id="8" name="Espace réservé du contenu 3"/>
-          <p:cNvSpPr txBox="1">
-            <a:spLocks/>
-          </p:cNvSpPr>
-          <p:nvPr/>
-        </p:nvSpPr>
-        <p:spPr>
-          <a:xfrm>
-            <a:off x="395536" y="4581128"/>
-            <a:ext cx="8229600" cy="1034129"/>
-          </a:xfrm>
-          <a:prstGeom prst="rect">
-            <a:avLst/>
-          </a:prstGeom>
-          <a:noFill/>
-        </p:spPr>
-        <p:txBody>
-          <a:bodyPr vert="horz" wrap="square" lIns="91440" tIns="45720" rIns="91440" bIns="45720" rtlCol="0">
-            <a:spAutoFit/>
-          </a:bodyPr>
-          <a:lstStyle/>
-          <a:p>
-            <a:pPr marL="0" marR="0" lvl="0" indent="0" algn="ctr" defTabSz="914400" rtl="0" eaLnBrk="1" fontAlgn="auto" latinLnBrk="0" hangingPunct="1">
-              <a:lnSpc>
-                <a:spcPct val="100000"/>
-              </a:lnSpc>
-              <a:spcBef>
-                <a:spcPct val="20000"/>
-              </a:spcBef>
-              <a:spcAft>
-                <a:spcPts val="0"/>
-              </a:spcAft>
-              <a:buClrTx/>
-              <a:buSzTx/>
-              <a:buFont typeface="Arial" pitchFamily="34" charset="0"/>
-              <a:buNone/>
-              <a:tabLst/>
-              <a:defRPr/>
-            </a:pPr>
-            <a:r>
-              <a:rPr kumimoji="0" lang="fr-FR" sz="1800" b="1" i="0" u="none" strike="noStrike" kern="1200" cap="none" spc="0" normalizeH="0" baseline="0" noProof="0" dirty="0" smtClean="0">
-                <a:ln>
-                  <a:noFill/>
-                </a:ln>
-                <a:effectLst/>
-                <a:uLnTx/>
-                <a:uFillTx/>
-                <a:latin typeface="+mn-lt"/>
-                <a:ea typeface="+mn-ea"/>
-                <a:cs typeface="+mn-cs"/>
-              </a:rPr>
-              <a:t>CES VALIDATIONS PERMETTRONT:</a:t>
-            </a:r>
-          </a:p>
-          <a:p>
-            <a:pPr marL="0" marR="0" lvl="0" indent="0" defTabSz="914400" rtl="0" eaLnBrk="1" fontAlgn="auto" latinLnBrk="0" hangingPunct="1">
-              <a:lnSpc>
-                <a:spcPct val="100000"/>
-              </a:lnSpc>
-              <a:spcBef>
-                <a:spcPct val="20000"/>
-              </a:spcBef>
-              <a:spcAft>
-                <a:spcPts val="0"/>
-              </a:spcAft>
-              <a:buClrTx/>
-              <a:buSzTx/>
+              <a:rPr lang="fr-FR" sz="1800" dirty="0" smtClean="0"/>
+              <a:t>De définir comment le TI règlera le positionnement et l’axe de visée de la caméra en cas de besoin</a:t>
+            </a:r>
+          </a:p>
+          <a:p>
+            <a:pPr>
               <a:buFontTx/>
               <a:buChar char="-"/>
-              <a:tabLst/>
-              <a:defRPr/>
             </a:pPr>
             <a:r>
-              <a:rPr kumimoji="0" lang="fr-FR" sz="1800" b="0" i="0" u="none" strike="noStrike" kern="1200" cap="none" spc="0" normalizeH="0" baseline="0" noProof="0" dirty="0" smtClean="0">
-                <a:ln>
-                  <a:noFill/>
-                </a:ln>
-                <a:effectLst/>
-                <a:uLnTx/>
-                <a:uFillTx/>
-                <a:latin typeface="+mn-lt"/>
-                <a:ea typeface="+mn-ea"/>
-                <a:cs typeface="+mn-cs"/>
-              </a:rPr>
-              <a:t>  de vérifier la lisibilité des infos sur un écran d’affichage  retenu</a:t>
-            </a:r>
-          </a:p>
-          <a:p>
-            <a:pPr marL="0" marR="0" lvl="0" indent="0" defTabSz="914400" rtl="0" eaLnBrk="1" fontAlgn="auto" latinLnBrk="0" hangingPunct="1">
-              <a:lnSpc>
-                <a:spcPct val="100000"/>
-              </a:lnSpc>
-              <a:spcBef>
-                <a:spcPct val="20000"/>
-              </a:spcBef>
-              <a:spcAft>
-                <a:spcPts val="0"/>
-              </a:spcAft>
-              <a:buClrTx/>
-              <a:buSzTx/>
+              <a:rPr lang="fr-FR" sz="1800" dirty="0" smtClean="0"/>
+              <a:t>De préciser la définition du système de positionnement et  de pointage de la caméra sur son support (mat fixe ou mobile, pont roulant ou mat, axe de visée fixe ou mobile)</a:t>
+            </a:r>
+          </a:p>
+          <a:p>
+            <a:pPr>
               <a:buFontTx/>
               <a:buChar char="-"/>
-              <a:tabLst/>
-              <a:defRPr/>
             </a:pPr>
             <a:r>
-              <a:rPr lang="fr-FR" dirty="0" smtClean="0"/>
-              <a:t>  de vérifier le BF de la liaison entre l’ESP32 CAM et le système d’affichage retenu</a:t>
-            </a:r>
-            <a:endParaRPr kumimoji="0" lang="fr-FR" sz="3200" b="0" i="0" u="none" strike="noStrike" kern="1200" cap="none" spc="0" normalizeH="0" baseline="0" noProof="0" dirty="0" smtClean="0">
-              <a:ln>
-                <a:noFill/>
-              </a:ln>
-              <a:effectLst/>
-              <a:uLnTx/>
-              <a:uFillTx/>
-              <a:latin typeface="+mn-lt"/>
-              <a:ea typeface="+mn-ea"/>
-              <a:cs typeface="+mn-cs"/>
-            </a:endParaRPr>
+              <a:rPr lang="fr-FR" sz="1800" dirty="0" smtClean="0"/>
+              <a:t>D’adopter définitivement un plan de pose uniforme et plan</a:t>
+            </a:r>
+          </a:p>
+          <a:p>
+            <a:pPr>
+              <a:buFontTx/>
+              <a:buChar char="-"/>
+            </a:pPr>
+            <a:r>
+              <a:rPr lang="fr-FR" sz="1800" dirty="0" smtClean="0"/>
+              <a:t>De valider les algos de traitement d’image implantés dans le proto en essais (proto n°1)</a:t>
+            </a:r>
+          </a:p>
+          <a:p>
+            <a:pPr>
+              <a:buFontTx/>
+              <a:buChar char="-"/>
+            </a:pPr>
+            <a:r>
+              <a:rPr lang="fr-FR" sz="1800" dirty="0" smtClean="0"/>
+              <a:t>De préciser la définition du système d’affichage et de gestion du jeu futur</a:t>
+            </a:r>
+            <a:endParaRPr lang="fr-FR" dirty="0"/>
+          </a:p>
+        </p:txBody>
+      </p:sp>
+      <p:sp>
+        <p:nvSpPr>
+          <p:cNvPr id="5" name="Espace réservé du numéro de diapositive 4"/>
+          <p:cNvSpPr>
+            <a:spLocks noGrp="1"/>
+          </p:cNvSpPr>
+          <p:nvPr>
+            <p:ph type="sldNum" sz="quarter" idx="12"/>
+          </p:nvPr>
+        </p:nvSpPr>
+        <p:spPr/>
+        <p:txBody>
+          <a:bodyPr/>
+          <a:lstStyle/>
+          <a:p>
+            <a:fld id="{1B556100-060F-4735-9BD8-A816D0C09B57}" type="slidenum">
+              <a:rPr lang="fr-FR" smtClean="0"/>
+              <a:pPr/>
+              <a:t>4</a:t>
+            </a:fld>
+            <a:endParaRPr lang="fr-FR"/>
           </a:p>
         </p:txBody>
       </p:sp>
@@ -4211,6 +4963,764 @@
             <a:spLocks noGrp="1"/>
           </p:cNvSpPr>
           <p:nvPr>
+            <p:ph type="ctrTitle"/>
+          </p:nvPr>
+        </p:nvSpPr>
+        <p:spPr>
+          <a:xfrm>
+            <a:off x="611560" y="116632"/>
+            <a:ext cx="7772400" cy="648072"/>
+          </a:xfrm>
+        </p:spPr>
+        <p:txBody>
+          <a:bodyPr>
+            <a:normAutofit/>
+          </a:bodyPr>
+          <a:lstStyle/>
+          <a:p>
+            <a:r>
+              <a:rPr lang="fr-FR" sz="2800" dirty="0" smtClean="0"/>
+              <a:t>ANUMBY-RSJ23: Qwirkle - Validations préliminaires</a:t>
+            </a:r>
+            <a:endParaRPr lang="fr-FR" sz="2800" dirty="0"/>
+          </a:p>
+        </p:txBody>
+      </p:sp>
+      <p:sp>
+        <p:nvSpPr>
+          <p:cNvPr id="4" name="ZoneTexte 3"/>
+          <p:cNvSpPr txBox="1"/>
+          <p:nvPr/>
+        </p:nvSpPr>
+        <p:spPr>
+          <a:xfrm>
+            <a:off x="683568" y="908720"/>
+            <a:ext cx="7848872" cy="1200329"/>
+          </a:xfrm>
+          <a:prstGeom prst="rect">
+            <a:avLst/>
+          </a:prstGeom>
+        </p:spPr>
+        <p:style>
+          <a:lnRef idx="2">
+            <a:schemeClr val="dk1"/>
+          </a:lnRef>
+          <a:fillRef idx="1">
+            <a:schemeClr val="lt1"/>
+          </a:fillRef>
+          <a:effectRef idx="0">
+            <a:schemeClr val="dk1"/>
+          </a:effectRef>
+          <a:fontRef idx="minor">
+            <a:schemeClr val="dk1"/>
+          </a:fontRef>
+        </p:style>
+        <p:txBody>
+          <a:bodyPr wrap="square" rtlCol="0">
+            <a:spAutoFit/>
+          </a:bodyPr>
+          <a:lstStyle/>
+          <a:p>
+            <a:pPr algn="ctr"/>
+            <a:r>
+              <a:rPr lang="fr-FR" u="sng" dirty="0" smtClean="0">
+                <a:solidFill>
+                  <a:schemeClr val="tx1"/>
+                </a:solidFill>
+              </a:rPr>
+              <a:t>REGLAGE ANGULAIRE DE L’AXE DE VISEE DE LA CAMERA AVEC LE </a:t>
+            </a:r>
+            <a:r>
+              <a:rPr lang="fr-FR" b="1" u="sng" dirty="0" smtClean="0">
+                <a:solidFill>
+                  <a:schemeClr val="tx1"/>
+                </a:solidFill>
+              </a:rPr>
+              <a:t>PROTO N°2</a:t>
+            </a:r>
+          </a:p>
+          <a:p>
+            <a:r>
+              <a:rPr lang="fr-FR" dirty="0" smtClean="0">
+                <a:solidFill>
+                  <a:schemeClr val="tx1"/>
+                </a:solidFill>
+              </a:rPr>
+              <a:t>Mettre en œuvre le système d’orientation de l’axe de visée de la caméra  via des commandes envoyées par un  ESP32 CAM monté sur son shield (proto 2)</a:t>
+            </a:r>
+          </a:p>
+          <a:p>
+            <a:r>
+              <a:rPr lang="fr-FR" dirty="0" smtClean="0">
+                <a:solidFill>
+                  <a:schemeClr val="tx1"/>
+                </a:solidFill>
+              </a:rPr>
+              <a:t>Afficher l’image générée en temps réel, sur un PC (via la liaison USB du shield?)</a:t>
+            </a:r>
+            <a:endParaRPr lang="fr-FR" dirty="0">
+              <a:solidFill>
+                <a:schemeClr val="tx1"/>
+              </a:solidFill>
+            </a:endParaRPr>
+          </a:p>
+        </p:txBody>
+      </p:sp>
+      <p:sp>
+        <p:nvSpPr>
+          <p:cNvPr id="5" name="ZoneTexte 4"/>
+          <p:cNvSpPr txBox="1"/>
+          <p:nvPr/>
+        </p:nvSpPr>
+        <p:spPr>
+          <a:xfrm>
+            <a:off x="323528" y="2420888"/>
+            <a:ext cx="8568952" cy="1754326"/>
+          </a:xfrm>
+          <a:prstGeom prst="rect">
+            <a:avLst/>
+          </a:prstGeom>
+          <a:noFill/>
+        </p:spPr>
+        <p:txBody>
+          <a:bodyPr wrap="square" rtlCol="0">
+            <a:spAutoFit/>
+          </a:bodyPr>
+          <a:lstStyle/>
+          <a:p>
+            <a:pPr algn="ctr"/>
+            <a:r>
+              <a:rPr lang="fr-FR" b="1" dirty="0" smtClean="0"/>
+              <a:t>POUR POUVOIR EFFECTUER CES VALIDATIONS, IL FAUT:</a:t>
+            </a:r>
+          </a:p>
+          <a:p>
+            <a:r>
+              <a:rPr lang="fr-FR" dirty="0" smtClean="0"/>
+              <a:t>-  </a:t>
+            </a:r>
+            <a:r>
+              <a:rPr lang="fr-FR" u="sng" dirty="0" smtClean="0"/>
+              <a:t>Un ensemble ESP32 CAM</a:t>
+            </a:r>
+            <a:r>
+              <a:rPr lang="fr-FR" dirty="0" smtClean="0"/>
+              <a:t>   dont la caméra est positionnée sur le système d’orientation fixé en haut d’un mat.</a:t>
+            </a:r>
+          </a:p>
+          <a:p>
+            <a:pPr>
+              <a:buFontTx/>
+              <a:buChar char="-"/>
+            </a:pPr>
+            <a:r>
+              <a:rPr lang="fr-FR" dirty="0" smtClean="0"/>
+              <a:t>  </a:t>
+            </a:r>
+            <a:r>
+              <a:rPr lang="fr-FR" u="sng" dirty="0" smtClean="0"/>
+              <a:t>un PC outillage</a:t>
+            </a:r>
+            <a:r>
+              <a:rPr lang="fr-FR" dirty="0" smtClean="0"/>
+              <a:t> pour afficher en direct les images créées.</a:t>
+            </a:r>
+          </a:p>
+          <a:p>
+            <a:pPr>
+              <a:buFontTx/>
+              <a:buChar char="-"/>
+            </a:pPr>
+            <a:r>
+              <a:rPr lang="fr-FR" dirty="0" smtClean="0"/>
+              <a:t>  ces validations sont indépendantes des essais sur le proto n°1</a:t>
+            </a:r>
+          </a:p>
+          <a:p>
+            <a:pPr>
+              <a:buFontTx/>
+              <a:buChar char="-"/>
+            </a:pPr>
+            <a:r>
+              <a:rPr lang="fr-FR" dirty="0" smtClean="0"/>
+              <a:t>  </a:t>
+            </a:r>
+            <a:endParaRPr lang="fr-FR" dirty="0"/>
+          </a:p>
+        </p:txBody>
+      </p:sp>
+      <p:sp>
+        <p:nvSpPr>
+          <p:cNvPr id="6" name="Espace réservé du contenu 3"/>
+          <p:cNvSpPr txBox="1">
+            <a:spLocks/>
+          </p:cNvSpPr>
+          <p:nvPr/>
+        </p:nvSpPr>
+        <p:spPr>
+          <a:xfrm>
+            <a:off x="395536" y="4309610"/>
+            <a:ext cx="8229600" cy="1366528"/>
+          </a:xfrm>
+          <a:prstGeom prst="rect">
+            <a:avLst/>
+          </a:prstGeom>
+          <a:noFill/>
+        </p:spPr>
+        <p:txBody>
+          <a:bodyPr vert="horz" wrap="square" lIns="91440" tIns="45720" rIns="91440" bIns="45720" rtlCol="0">
+            <a:spAutoFit/>
+          </a:bodyPr>
+          <a:lstStyle/>
+          <a:p>
+            <a:pPr marL="0" marR="0" lvl="0" indent="0" algn="ctr" defTabSz="914400" rtl="0" eaLnBrk="1" fontAlgn="auto" latinLnBrk="0" hangingPunct="1">
+              <a:lnSpc>
+                <a:spcPct val="100000"/>
+              </a:lnSpc>
+              <a:spcBef>
+                <a:spcPct val="20000"/>
+              </a:spcBef>
+              <a:spcAft>
+                <a:spcPts val="0"/>
+              </a:spcAft>
+              <a:buClrTx/>
+              <a:buSzTx/>
+              <a:buFont typeface="Arial" pitchFamily="34" charset="0"/>
+              <a:buNone/>
+              <a:tabLst/>
+              <a:defRPr/>
+            </a:pPr>
+            <a:r>
+              <a:rPr kumimoji="0" lang="fr-FR" sz="1800" b="1" i="0" u="none" strike="noStrike" kern="1200" cap="none" spc="0" normalizeH="0" baseline="0" noProof="0" dirty="0" smtClean="0">
+                <a:ln>
+                  <a:noFill/>
+                </a:ln>
+                <a:effectLst/>
+                <a:uLnTx/>
+                <a:uFillTx/>
+                <a:latin typeface="+mn-lt"/>
+                <a:ea typeface="+mn-ea"/>
+                <a:cs typeface="+mn-cs"/>
+              </a:rPr>
+              <a:t>CES VALIDATIONS PERMETTRONT:</a:t>
+            </a:r>
+          </a:p>
+          <a:p>
+            <a:pPr marL="0" marR="0" lvl="0" indent="0" defTabSz="914400" rtl="0" eaLnBrk="1" fontAlgn="auto" latinLnBrk="0" hangingPunct="1">
+              <a:lnSpc>
+                <a:spcPct val="100000"/>
+              </a:lnSpc>
+              <a:spcBef>
+                <a:spcPct val="20000"/>
+              </a:spcBef>
+              <a:spcAft>
+                <a:spcPts val="0"/>
+              </a:spcAft>
+              <a:buClrTx/>
+              <a:buSzTx/>
+              <a:buFontTx/>
+              <a:buChar char="-"/>
+              <a:tabLst/>
+              <a:defRPr/>
+            </a:pPr>
+            <a:r>
+              <a:rPr kumimoji="0" lang="fr-FR" sz="1800" b="0" i="0" u="none" strike="noStrike" kern="1200" cap="none" spc="0" normalizeH="0" baseline="0" noProof="0" dirty="0" smtClean="0">
+                <a:ln>
+                  <a:noFill/>
+                </a:ln>
+                <a:effectLst/>
+                <a:uLnTx/>
+                <a:uFillTx/>
+                <a:latin typeface="+mn-lt"/>
+                <a:ea typeface="+mn-ea"/>
+                <a:cs typeface="+mn-cs"/>
+              </a:rPr>
+              <a:t>  de vérifier le BF du pointage en site et gisement de l’axe de visée de la caméra</a:t>
+            </a:r>
+          </a:p>
+          <a:p>
+            <a:pPr marL="0" marR="0" lvl="0" indent="0" defTabSz="914400" rtl="0" eaLnBrk="1" fontAlgn="auto" latinLnBrk="0" hangingPunct="1">
+              <a:lnSpc>
+                <a:spcPct val="100000"/>
+              </a:lnSpc>
+              <a:spcBef>
+                <a:spcPct val="20000"/>
+              </a:spcBef>
+              <a:spcAft>
+                <a:spcPts val="0"/>
+              </a:spcAft>
+              <a:buClrTx/>
+              <a:buSzTx/>
+              <a:buFontTx/>
+              <a:buChar char="-"/>
+              <a:tabLst/>
+              <a:defRPr/>
+            </a:pPr>
+            <a:r>
+              <a:rPr kumimoji="0" lang="fr-FR" sz="1800" b="0" i="0" u="none" strike="noStrike" kern="1200" cap="none" spc="0" normalizeH="0" baseline="0" noProof="0" dirty="0" smtClean="0">
+                <a:ln>
+                  <a:noFill/>
+                </a:ln>
+                <a:effectLst/>
+                <a:uLnTx/>
+                <a:uFillTx/>
+                <a:latin typeface="+mn-lt"/>
+                <a:ea typeface="+mn-ea"/>
+                <a:cs typeface="+mn-cs"/>
+              </a:rPr>
+              <a:t>  de vérifier que les angles commandés sont bien cohérents avec ceux réalisés</a:t>
+            </a:r>
+          </a:p>
+          <a:p>
+            <a:pPr marL="0" marR="0" lvl="0" indent="0" defTabSz="914400" rtl="0" eaLnBrk="1" fontAlgn="auto" latinLnBrk="0" hangingPunct="1">
+              <a:lnSpc>
+                <a:spcPct val="100000"/>
+              </a:lnSpc>
+              <a:spcBef>
+                <a:spcPct val="20000"/>
+              </a:spcBef>
+              <a:spcAft>
+                <a:spcPts val="0"/>
+              </a:spcAft>
+              <a:buClrTx/>
+              <a:buSzTx/>
+              <a:buFontTx/>
+              <a:buChar char="-"/>
+              <a:tabLst/>
+              <a:defRPr/>
+            </a:pPr>
+            <a:r>
+              <a:rPr kumimoji="0" lang="fr-FR" sz="1800" b="0" i="0" u="none" strike="noStrike" kern="1200" cap="none" spc="0" normalizeH="0" baseline="0" noProof="0" dirty="0" smtClean="0">
+                <a:ln>
+                  <a:noFill/>
+                </a:ln>
+                <a:effectLst/>
+                <a:uLnTx/>
+                <a:uFillTx/>
+                <a:latin typeface="+mn-lt"/>
+                <a:ea typeface="+mn-ea"/>
+                <a:cs typeface="+mn-cs"/>
+              </a:rPr>
+              <a:t>  de définir le champ de réglage angulaire en site et en gisement</a:t>
+            </a:r>
+            <a:endParaRPr kumimoji="0" lang="fr-FR" sz="3200" b="0" i="0" u="none" strike="noStrike" kern="1200" cap="none" spc="0" normalizeH="0" baseline="0" noProof="0" dirty="0" smtClean="0">
+              <a:ln>
+                <a:noFill/>
+              </a:ln>
+              <a:effectLst/>
+              <a:uLnTx/>
+              <a:uFillTx/>
+              <a:latin typeface="+mn-lt"/>
+              <a:ea typeface="+mn-ea"/>
+              <a:cs typeface="+mn-cs"/>
+            </a:endParaRPr>
+          </a:p>
+        </p:txBody>
+      </p:sp>
+      <p:sp>
+        <p:nvSpPr>
+          <p:cNvPr id="7" name="Espace réservé du numéro de diapositive 6"/>
+          <p:cNvSpPr>
+            <a:spLocks noGrp="1"/>
+          </p:cNvSpPr>
+          <p:nvPr>
+            <p:ph type="sldNum" sz="quarter" idx="12"/>
+          </p:nvPr>
+        </p:nvSpPr>
+        <p:spPr/>
+        <p:txBody>
+          <a:bodyPr/>
+          <a:lstStyle/>
+          <a:p>
+            <a:fld id="{1B556100-060F-4735-9BD8-A816D0C09B57}" type="slidenum">
+              <a:rPr lang="fr-FR" smtClean="0"/>
+              <a:pPr/>
+              <a:t>5</a:t>
+            </a:fld>
+            <a:endParaRPr lang="fr-FR"/>
+          </a:p>
+        </p:txBody>
+      </p:sp>
+    </p:spTree>
+  </p:cSld>
+  <p:clrMapOvr>
+    <a:masterClrMapping/>
+  </p:clrMapOvr>
+</p:sld>
+</file>
+
+<file path=ppt/slides/slide6.xml><?xml version="1.0" encoding="utf-8"?>
+<p:sld xmlns:a="http://schemas.openxmlformats.org/drawingml/2006/main" xmlns:r="http://schemas.openxmlformats.org/officeDocument/2006/relationships" xmlns:p="http://schemas.openxmlformats.org/presentationml/2006/main">
+  <p:cSld>
+    <p:spTree>
+      <p:nvGrpSpPr>
+        <p:cNvPr id="1" name=""/>
+        <p:cNvGrpSpPr/>
+        <p:nvPr/>
+      </p:nvGrpSpPr>
+      <p:grpSpPr>
+        <a:xfrm>
+          <a:off x="0" y="0"/>
+          <a:ext cx="0" cy="0"/>
+          <a:chOff x="0" y="0"/>
+          <a:chExt cx="0" cy="0"/>
+        </a:xfrm>
+      </p:grpSpPr>
+      <p:sp>
+        <p:nvSpPr>
+          <p:cNvPr id="2" name="Titre 1"/>
+          <p:cNvSpPr>
+            <a:spLocks noGrp="1"/>
+          </p:cNvSpPr>
+          <p:nvPr>
+            <p:ph type="ctrTitle"/>
+          </p:nvPr>
+        </p:nvSpPr>
+        <p:spPr>
+          <a:xfrm>
+            <a:off x="611560" y="116632"/>
+            <a:ext cx="7772400" cy="648072"/>
+          </a:xfrm>
+        </p:spPr>
+        <p:txBody>
+          <a:bodyPr>
+            <a:normAutofit/>
+          </a:bodyPr>
+          <a:lstStyle/>
+          <a:p>
+            <a:r>
+              <a:rPr lang="fr-FR" sz="2800" dirty="0" smtClean="0"/>
+              <a:t>ANUMBY-RSJ23: Qwirkle - Validations préliminaires</a:t>
+            </a:r>
+            <a:endParaRPr lang="fr-FR" sz="2800" dirty="0"/>
+          </a:p>
+        </p:txBody>
+      </p:sp>
+      <p:sp>
+        <p:nvSpPr>
+          <p:cNvPr id="4" name="ZoneTexte 3"/>
+          <p:cNvSpPr txBox="1"/>
+          <p:nvPr/>
+        </p:nvSpPr>
+        <p:spPr>
+          <a:xfrm>
+            <a:off x="683568" y="908720"/>
+            <a:ext cx="7848872" cy="1200329"/>
+          </a:xfrm>
+          <a:prstGeom prst="rect">
+            <a:avLst/>
+          </a:prstGeom>
+        </p:spPr>
+        <p:style>
+          <a:lnRef idx="2">
+            <a:schemeClr val="dk1"/>
+          </a:lnRef>
+          <a:fillRef idx="1">
+            <a:schemeClr val="lt1"/>
+          </a:fillRef>
+          <a:effectRef idx="0">
+            <a:schemeClr val="dk1"/>
+          </a:effectRef>
+          <a:fontRef idx="minor">
+            <a:schemeClr val="dk1"/>
+          </a:fontRef>
+        </p:style>
+        <p:txBody>
+          <a:bodyPr wrap="square" rtlCol="0">
+            <a:spAutoFit/>
+          </a:bodyPr>
+          <a:lstStyle/>
+          <a:p>
+            <a:pPr algn="ctr"/>
+            <a:r>
+              <a:rPr lang="fr-FR" u="sng" dirty="0" smtClean="0">
+                <a:solidFill>
+                  <a:schemeClr val="tx1"/>
+                </a:solidFill>
+              </a:rPr>
+              <a:t>AFFICHAGE DES IMAGES ET DE LA GESTION DE  LA PARTIE AVEC LE </a:t>
+            </a:r>
+            <a:r>
+              <a:rPr lang="fr-FR" b="1" u="sng" dirty="0" smtClean="0">
+                <a:solidFill>
+                  <a:schemeClr val="tx1"/>
+                </a:solidFill>
+              </a:rPr>
+              <a:t>PROTO N°3</a:t>
+            </a:r>
+          </a:p>
+          <a:p>
+            <a:r>
+              <a:rPr lang="fr-FR" dirty="0" smtClean="0">
+                <a:solidFill>
+                  <a:schemeClr val="tx1"/>
+                </a:solidFill>
+              </a:rPr>
+              <a:t>Valider l’affichage des infos de gestion de la partie (interaction avec les joueurs, score), l’affichage d’images et de grilles avec l’écran choisi</a:t>
+            </a:r>
+          </a:p>
+          <a:p>
+            <a:r>
+              <a:rPr lang="fr-FR" dirty="0" smtClean="0">
+                <a:solidFill>
+                  <a:schemeClr val="tx1"/>
+                </a:solidFill>
+              </a:rPr>
+              <a:t>Défi</a:t>
+            </a:r>
+          </a:p>
+        </p:txBody>
+      </p:sp>
+      <p:sp>
+        <p:nvSpPr>
+          <p:cNvPr id="7" name="ZoneTexte 6"/>
+          <p:cNvSpPr txBox="1"/>
+          <p:nvPr/>
+        </p:nvSpPr>
+        <p:spPr>
+          <a:xfrm>
+            <a:off x="323528" y="2420888"/>
+            <a:ext cx="8568952" cy="2031325"/>
+          </a:xfrm>
+          <a:prstGeom prst="rect">
+            <a:avLst/>
+          </a:prstGeom>
+          <a:noFill/>
+        </p:spPr>
+        <p:txBody>
+          <a:bodyPr wrap="square" rtlCol="0">
+            <a:spAutoFit/>
+          </a:bodyPr>
+          <a:lstStyle/>
+          <a:p>
+            <a:pPr algn="ctr"/>
+            <a:r>
+              <a:rPr lang="fr-FR" b="1" dirty="0" smtClean="0"/>
+              <a:t>POUR POUVOIR EFFECTUER CES VALIDATIONS, IL FAUT:</a:t>
+            </a:r>
+          </a:p>
+          <a:p>
+            <a:pPr>
+              <a:buFontTx/>
+              <a:buChar char="-"/>
+            </a:pPr>
+            <a:r>
+              <a:rPr lang="fr-FR" dirty="0" smtClean="0"/>
+              <a:t>  </a:t>
+            </a:r>
+            <a:r>
+              <a:rPr lang="fr-FR" u="sng" dirty="0" smtClean="0"/>
+              <a:t>Un ensemble ESP32 CAM,</a:t>
+            </a:r>
+            <a:r>
+              <a:rPr lang="fr-FR" dirty="0" smtClean="0"/>
+              <a:t>   un outillage ou un PC pour générées les infos qui seront générées dans le futur par le l’ESP 32 CAM définitif (image caméra, grille, info « dépose correcte et conforme à la règle du jeu », info « au joueur suivant de jouer », le score mis à jour)  </a:t>
+            </a:r>
+          </a:p>
+          <a:p>
+            <a:pPr>
+              <a:buFontTx/>
+              <a:buChar char="-"/>
+            </a:pPr>
+            <a:r>
+              <a:rPr lang="fr-FR" dirty="0" smtClean="0"/>
+              <a:t>  ces validations seront menées mi-février 2023</a:t>
+            </a:r>
+          </a:p>
+          <a:p>
+            <a:pPr>
+              <a:buFontTx/>
+              <a:buChar char="-"/>
+            </a:pPr>
+            <a:r>
+              <a:rPr lang="fr-FR" dirty="0" smtClean="0"/>
+              <a:t> si possible un système d’affichage retenu  </a:t>
+            </a:r>
+            <a:endParaRPr lang="fr-FR" dirty="0"/>
+          </a:p>
+        </p:txBody>
+      </p:sp>
+      <p:sp>
+        <p:nvSpPr>
+          <p:cNvPr id="8" name="Espace réservé du contenu 3"/>
+          <p:cNvSpPr txBox="1">
+            <a:spLocks/>
+          </p:cNvSpPr>
+          <p:nvPr/>
+        </p:nvSpPr>
+        <p:spPr>
+          <a:xfrm>
+            <a:off x="395536" y="4581128"/>
+            <a:ext cx="8229600" cy="1034129"/>
+          </a:xfrm>
+          <a:prstGeom prst="rect">
+            <a:avLst/>
+          </a:prstGeom>
+          <a:noFill/>
+        </p:spPr>
+        <p:txBody>
+          <a:bodyPr vert="horz" wrap="square" lIns="91440" tIns="45720" rIns="91440" bIns="45720" rtlCol="0">
+            <a:spAutoFit/>
+          </a:bodyPr>
+          <a:lstStyle/>
+          <a:p>
+            <a:pPr marL="0" marR="0" lvl="0" indent="0" algn="ctr" defTabSz="914400" rtl="0" eaLnBrk="1" fontAlgn="auto" latinLnBrk="0" hangingPunct="1">
+              <a:lnSpc>
+                <a:spcPct val="100000"/>
+              </a:lnSpc>
+              <a:spcBef>
+                <a:spcPct val="20000"/>
+              </a:spcBef>
+              <a:spcAft>
+                <a:spcPts val="0"/>
+              </a:spcAft>
+              <a:buClrTx/>
+              <a:buSzTx/>
+              <a:buFont typeface="Arial" pitchFamily="34" charset="0"/>
+              <a:buNone/>
+              <a:tabLst/>
+              <a:defRPr/>
+            </a:pPr>
+            <a:r>
+              <a:rPr kumimoji="0" lang="fr-FR" sz="1800" b="1" i="0" u="none" strike="noStrike" kern="1200" cap="none" spc="0" normalizeH="0" baseline="0" noProof="0" dirty="0" smtClean="0">
+                <a:ln>
+                  <a:noFill/>
+                </a:ln>
+                <a:effectLst/>
+                <a:uLnTx/>
+                <a:uFillTx/>
+                <a:latin typeface="+mn-lt"/>
+                <a:ea typeface="+mn-ea"/>
+                <a:cs typeface="+mn-cs"/>
+              </a:rPr>
+              <a:t>CES VALIDATIONS PERMETTRONT:</a:t>
+            </a:r>
+          </a:p>
+          <a:p>
+            <a:pPr marL="0" marR="0" lvl="0" indent="0" defTabSz="914400" rtl="0" eaLnBrk="1" fontAlgn="auto" latinLnBrk="0" hangingPunct="1">
+              <a:lnSpc>
+                <a:spcPct val="100000"/>
+              </a:lnSpc>
+              <a:spcBef>
+                <a:spcPct val="20000"/>
+              </a:spcBef>
+              <a:spcAft>
+                <a:spcPts val="0"/>
+              </a:spcAft>
+              <a:buClrTx/>
+              <a:buSzTx/>
+              <a:buFontTx/>
+              <a:buChar char="-"/>
+              <a:tabLst/>
+              <a:defRPr/>
+            </a:pPr>
+            <a:r>
+              <a:rPr kumimoji="0" lang="fr-FR" sz="1800" b="0" i="0" u="none" strike="noStrike" kern="1200" cap="none" spc="0" normalizeH="0" baseline="0" noProof="0" dirty="0" smtClean="0">
+                <a:ln>
+                  <a:noFill/>
+                </a:ln>
+                <a:effectLst/>
+                <a:uLnTx/>
+                <a:uFillTx/>
+                <a:latin typeface="+mn-lt"/>
+                <a:ea typeface="+mn-ea"/>
+                <a:cs typeface="+mn-cs"/>
+              </a:rPr>
+              <a:t>  de vérifier la lisibilité des infos sur un écran d’affichage  retenu</a:t>
+            </a:r>
+          </a:p>
+          <a:p>
+            <a:pPr marL="0" marR="0" lvl="0" indent="0" defTabSz="914400" rtl="0" eaLnBrk="1" fontAlgn="auto" latinLnBrk="0" hangingPunct="1">
+              <a:lnSpc>
+                <a:spcPct val="100000"/>
+              </a:lnSpc>
+              <a:spcBef>
+                <a:spcPct val="20000"/>
+              </a:spcBef>
+              <a:spcAft>
+                <a:spcPts val="0"/>
+              </a:spcAft>
+              <a:buClrTx/>
+              <a:buSzTx/>
+              <a:buFontTx/>
+              <a:buChar char="-"/>
+              <a:tabLst/>
+              <a:defRPr/>
+            </a:pPr>
+            <a:r>
+              <a:rPr lang="fr-FR" dirty="0" smtClean="0"/>
+              <a:t>  de vérifier le BF de la liaison entre l’ESP32 CAM et le système d’affichage retenu</a:t>
+            </a:r>
+            <a:endParaRPr kumimoji="0" lang="fr-FR" sz="3200" b="0" i="0" u="none" strike="noStrike" kern="1200" cap="none" spc="0" normalizeH="0" baseline="0" noProof="0" dirty="0" smtClean="0">
+              <a:ln>
+                <a:noFill/>
+              </a:ln>
+              <a:effectLst/>
+              <a:uLnTx/>
+              <a:uFillTx/>
+              <a:latin typeface="+mn-lt"/>
+              <a:ea typeface="+mn-ea"/>
+              <a:cs typeface="+mn-cs"/>
+            </a:endParaRPr>
+          </a:p>
+        </p:txBody>
+      </p:sp>
+      <p:sp>
+        <p:nvSpPr>
+          <p:cNvPr id="6" name="Espace réservé du numéro de diapositive 5"/>
+          <p:cNvSpPr>
+            <a:spLocks noGrp="1"/>
+          </p:cNvSpPr>
+          <p:nvPr>
+            <p:ph type="sldNum" sz="quarter" idx="12"/>
+          </p:nvPr>
+        </p:nvSpPr>
+        <p:spPr/>
+        <p:txBody>
+          <a:bodyPr/>
+          <a:lstStyle/>
+          <a:p>
+            <a:fld id="{1B556100-060F-4735-9BD8-A816D0C09B57}" type="slidenum">
+              <a:rPr lang="fr-FR" smtClean="0"/>
+              <a:pPr/>
+              <a:t>6</a:t>
+            </a:fld>
+            <a:endParaRPr lang="fr-FR"/>
+          </a:p>
+        </p:txBody>
+      </p:sp>
+    </p:spTree>
+  </p:cSld>
+  <p:clrMapOvr>
+    <a:masterClrMapping/>
+  </p:clrMapOvr>
+</p:sld>
+</file>
+
+<file path=ppt/slides/slide7.xml><?xml version="1.0" encoding="utf-8"?>
+<p:sld xmlns:a="http://schemas.openxmlformats.org/drawingml/2006/main" xmlns:r="http://schemas.openxmlformats.org/officeDocument/2006/relationships" xmlns:p="http://schemas.openxmlformats.org/presentationml/2006/main">
+  <p:cSld>
+    <p:spTree>
+      <p:nvGrpSpPr>
+        <p:cNvPr id="1" name=""/>
+        <p:cNvGrpSpPr/>
+        <p:nvPr/>
+      </p:nvGrpSpPr>
+      <p:grpSpPr>
+        <a:xfrm>
+          <a:off x="0" y="0"/>
+          <a:ext cx="0" cy="0"/>
+          <a:chOff x="0" y="0"/>
+          <a:chExt cx="0" cy="0"/>
+        </a:xfrm>
+      </p:grpSpPr>
+      <p:sp>
+        <p:nvSpPr>
+          <p:cNvPr id="2" name="Titre 1"/>
+          <p:cNvSpPr>
+            <a:spLocks noGrp="1"/>
+          </p:cNvSpPr>
+          <p:nvPr>
             <p:ph type="title"/>
           </p:nvPr>
         </p:nvSpPr>
@@ -4461,6 +5971,30 @@
               <a:t>Soit un simple écran avec un liaison filaire à l’ESP32 CAM</a:t>
             </a:r>
             <a:endParaRPr lang="fr-FR" dirty="0"/>
+          </a:p>
+        </p:txBody>
+      </p:sp>
+      <p:sp>
+        <p:nvSpPr>
+          <p:cNvPr id="8" name="Espace réservé du numéro de diapositive 7"/>
+          <p:cNvSpPr>
+            <a:spLocks noGrp="1"/>
+          </p:cNvSpPr>
+          <p:nvPr>
+            <p:ph type="sldNum" sz="quarter" idx="12"/>
+          </p:nvPr>
+        </p:nvSpPr>
+        <p:spPr/>
+        <p:txBody>
+          <a:bodyPr/>
+          <a:lstStyle/>
+          <a:p>
+            <a:fld id="{1B556100-060F-4735-9BD8-A816D0C09B57}" type="slidenum">
+              <a:rPr lang="fr-FR" smtClean="0"/>
+              <a:pPr/>
+              <a:t>7</a:t>
+            </a:fld>
+            <a:endParaRPr lang="fr-FR"/>
           </a:p>
         </p:txBody>
       </p:sp>
@@ -4753,4 +6287,570 @@
   <a:objectDefaults/>
   <a:extraClrSchemeLst/>
 </a:theme>
+</file>
+
+<file path=ppt/theme/theme2.xml><?xml version="1.0" encoding="utf-8"?>
+<a:theme xmlns:a="http://schemas.openxmlformats.org/drawingml/2006/main" name="Thème Office">
+  <a:themeElements>
+    <a:clrScheme name="Office">
+      <a:dk1>
+        <a:sysClr val="windowText" lastClr="000000"/>
+      </a:dk1>
+      <a:lt1>
+        <a:sysClr val="window" lastClr="FFFFFF"/>
+      </a:lt1>
+      <a:dk2>
+        <a:srgbClr val="1F497D"/>
+      </a:dk2>
+      <a:lt2>
+        <a:srgbClr val="EEECE1"/>
+      </a:lt2>
+      <a:accent1>
+        <a:srgbClr val="4F81BD"/>
+      </a:accent1>
+      <a:accent2>
+        <a:srgbClr val="C0504D"/>
+      </a:accent2>
+      <a:accent3>
+        <a:srgbClr val="9BBB59"/>
+      </a:accent3>
+      <a:accent4>
+        <a:srgbClr val="8064A2"/>
+      </a:accent4>
+      <a:accent5>
+        <a:srgbClr val="4BACC6"/>
+      </a:accent5>
+      <a:accent6>
+        <a:srgbClr val="F79646"/>
+      </a:accent6>
+      <a:hlink>
+        <a:srgbClr val="0000FF"/>
+      </a:hlink>
+      <a:folHlink>
+        <a:srgbClr val="800080"/>
+      </a:folHlink>
+    </a:clrScheme>
+    <a:fontScheme name="Office">
+      <a:majorFont>
+        <a:latin typeface="Calibri"/>
+        <a:ea typeface=""/>
+        <a:cs typeface=""/>
+        <a:font script="Jpan" typeface="ＭＳ Ｐゴシック"/>
+        <a:font script="Hang" typeface="맑은 고딕"/>
+        <a:font script="Hans" typeface="宋体"/>
+        <a:font script="Hant" typeface="新細明體"/>
+        <a:font script="Arab" typeface="Times New Roman"/>
+        <a:font script="Hebr" typeface="Times New Roman"/>
+        <a:font script="Thai" typeface="Angsana New"/>
+        <a:font script="Ethi" typeface="Nyala"/>
+        <a:font script="Beng" typeface="Vrinda"/>
+        <a:font script="Gujr" typeface="Shruti"/>
+        <a:font script="Khmr" typeface="MoolBoran"/>
+        <a:font script="Knda" typeface="Tunga"/>
+        <a:font script="Guru" typeface="Raavi"/>
+        <a:font script="Cans" typeface="Euphemia"/>
+        <a:font script="Cher" typeface="Plantagenet Cherokee"/>
+        <a:font script="Yiii" typeface="Microsoft Yi Baiti"/>
+        <a:font script="Tibt" typeface="Microsoft Himalaya"/>
+        <a:font script="Thaa" typeface="MV Boli"/>
+        <a:font script="Deva" typeface="Mangal"/>
+        <a:font script="Telu" typeface="Gautami"/>
+        <a:font script="Taml" typeface="Latha"/>
+        <a:font script="Syrc" typeface="Estrangelo Edessa"/>
+        <a:font script="Orya" typeface="Kalinga"/>
+        <a:font script="Mlym" typeface="Kartika"/>
+        <a:font script="Laoo" typeface="DokChampa"/>
+        <a:font script="Sinh" typeface="Iskoola Pota"/>
+        <a:font script="Mong" typeface="Mongolian Baiti"/>
+        <a:font script="Viet" typeface="Times New Roman"/>
+        <a:font script="Uigh" typeface="Microsoft Uighur"/>
+      </a:majorFont>
+      <a:minorFont>
+        <a:latin typeface="Calibri"/>
+        <a:ea typeface=""/>
+        <a:cs typeface=""/>
+        <a:font script="Jpan" typeface="ＭＳ Ｐゴシック"/>
+        <a:font script="Hang" typeface="맑은 고딕"/>
+        <a:font script="Hans" typeface="宋体"/>
+        <a:font script="Hant" typeface="新細明體"/>
+        <a:font script="Arab" typeface="Arial"/>
+        <a:font script="Hebr" typeface="Arial"/>
+        <a:font script="Thai" typeface="Cordia New"/>
+        <a:font script="Ethi" typeface="Nyala"/>
+        <a:font script="Beng" typeface="Vrinda"/>
+        <a:font script="Gujr" typeface="Shruti"/>
+        <a:font script="Khmr" typeface="DaunPenh"/>
+        <a:font script="Knda" typeface="Tunga"/>
+        <a:font script="Guru" typeface="Raavi"/>
+        <a:font script="Cans" typeface="Euphemia"/>
+        <a:font script="Cher" typeface="Plantagenet Cherokee"/>
+        <a:font script="Yiii" typeface="Microsoft Yi Baiti"/>
+        <a:font script="Tibt" typeface="Microsoft Himalaya"/>
+        <a:font script="Thaa" typeface="MV Boli"/>
+        <a:font script="Deva" typeface="Mangal"/>
+        <a:font script="Telu" typeface="Gautami"/>
+        <a:font script="Taml" typeface="Latha"/>
+        <a:font script="Syrc" typeface="Estrangelo Edessa"/>
+        <a:font script="Orya" typeface="Kalinga"/>
+        <a:font script="Mlym" typeface="Kartika"/>
+        <a:font script="Laoo" typeface="DokChampa"/>
+        <a:font script="Sinh" typeface="Iskoola Pota"/>
+        <a:font script="Mong" typeface="Mongolian Baiti"/>
+        <a:font script="Viet" typeface="Arial"/>
+        <a:font script="Uigh" typeface="Microsoft Uighur"/>
+      </a:minorFont>
+    </a:fontScheme>
+    <a:fmtScheme name="Office">
+      <a:fillStyleLst>
+        <a:solidFill>
+          <a:schemeClr val="phClr"/>
+        </a:solidFill>
+        <a:gradFill rotWithShape="1">
+          <a:gsLst>
+            <a:gs pos="0">
+              <a:schemeClr val="phClr">
+                <a:tint val="50000"/>
+                <a:satMod val="300000"/>
+              </a:schemeClr>
+            </a:gs>
+            <a:gs pos="35000">
+              <a:schemeClr val="phClr">
+                <a:tint val="37000"/>
+                <a:satMod val="300000"/>
+              </a:schemeClr>
+            </a:gs>
+            <a:gs pos="100000">
+              <a:schemeClr val="phClr">
+                <a:tint val="15000"/>
+                <a:satMod val="350000"/>
+              </a:schemeClr>
+            </a:gs>
+          </a:gsLst>
+          <a:lin ang="16200000" scaled="1"/>
+        </a:gradFill>
+        <a:gradFill rotWithShape="1">
+          <a:gsLst>
+            <a:gs pos="0">
+              <a:schemeClr val="phClr">
+                <a:shade val="51000"/>
+                <a:satMod val="130000"/>
+              </a:schemeClr>
+            </a:gs>
+            <a:gs pos="80000">
+              <a:schemeClr val="phClr">
+                <a:shade val="93000"/>
+                <a:satMod val="130000"/>
+              </a:schemeClr>
+            </a:gs>
+            <a:gs pos="100000">
+              <a:schemeClr val="phClr">
+                <a:shade val="94000"/>
+                <a:satMod val="135000"/>
+              </a:schemeClr>
+            </a:gs>
+          </a:gsLst>
+          <a:lin ang="16200000" scaled="0"/>
+        </a:gradFill>
+      </a:fillStyleLst>
+      <a:lnStyleLst>
+        <a:ln w="9525" cap="flat" cmpd="sng" algn="ctr">
+          <a:solidFill>
+            <a:schemeClr val="phClr">
+              <a:shade val="95000"/>
+              <a:satMod val="105000"/>
+            </a:schemeClr>
+          </a:solidFill>
+          <a:prstDash val="solid"/>
+        </a:ln>
+        <a:ln w="25400" cap="flat" cmpd="sng" algn="ctr">
+          <a:solidFill>
+            <a:schemeClr val="phClr"/>
+          </a:solidFill>
+          <a:prstDash val="solid"/>
+        </a:ln>
+        <a:ln w="38100" cap="flat" cmpd="sng" algn="ctr">
+          <a:solidFill>
+            <a:schemeClr val="phClr"/>
+          </a:solidFill>
+          <a:prstDash val="solid"/>
+        </a:ln>
+      </a:lnStyleLst>
+      <a:effectStyleLst>
+        <a:effectStyle>
+          <a:effectLst>
+            <a:outerShdw blurRad="40000" dist="20000" dir="5400000" rotWithShape="0">
+              <a:srgbClr val="000000">
+                <a:alpha val="38000"/>
+              </a:srgbClr>
+            </a:outerShdw>
+          </a:effectLst>
+        </a:effectStyle>
+        <a:effectStyle>
+          <a:effectLst>
+            <a:outerShdw blurRad="40000" dist="23000" dir="5400000" rotWithShape="0">
+              <a:srgbClr val="000000">
+                <a:alpha val="35000"/>
+              </a:srgbClr>
+            </a:outerShdw>
+          </a:effectLst>
+        </a:effectStyle>
+        <a:effectStyle>
+          <a:effectLst>
+            <a:outerShdw blurRad="40000" dist="23000" dir="5400000" rotWithShape="0">
+              <a:srgbClr val="000000">
+                <a:alpha val="35000"/>
+              </a:srgbClr>
+            </a:outerShdw>
+          </a:effectLst>
+          <a:scene3d>
+            <a:camera prst="orthographicFront">
+              <a:rot lat="0" lon="0" rev="0"/>
+            </a:camera>
+            <a:lightRig rig="threePt" dir="t">
+              <a:rot lat="0" lon="0" rev="1200000"/>
+            </a:lightRig>
+          </a:scene3d>
+          <a:sp3d>
+            <a:bevelT w="63500" h="25400"/>
+          </a:sp3d>
+        </a:effectStyle>
+      </a:effectStyleLst>
+      <a:bgFillStyleLst>
+        <a:solidFill>
+          <a:schemeClr val="phClr"/>
+        </a:solidFill>
+        <a:gradFill rotWithShape="1">
+          <a:gsLst>
+            <a:gs pos="0">
+              <a:schemeClr val="phClr">
+                <a:tint val="40000"/>
+                <a:satMod val="350000"/>
+              </a:schemeClr>
+            </a:gs>
+            <a:gs pos="40000">
+              <a:schemeClr val="phClr">
+                <a:tint val="45000"/>
+                <a:shade val="99000"/>
+                <a:satMod val="350000"/>
+              </a:schemeClr>
+            </a:gs>
+            <a:gs pos="100000">
+              <a:schemeClr val="phClr">
+                <a:shade val="20000"/>
+                <a:satMod val="255000"/>
+              </a:schemeClr>
+            </a:gs>
+          </a:gsLst>
+          <a:path path="circle">
+            <a:fillToRect l="50000" t="-80000" r="50000" b="180000"/>
+          </a:path>
+        </a:gradFill>
+        <a:gradFill rotWithShape="1">
+          <a:gsLst>
+            <a:gs pos="0">
+              <a:schemeClr val="phClr">
+                <a:tint val="80000"/>
+                <a:satMod val="300000"/>
+              </a:schemeClr>
+            </a:gs>
+            <a:gs pos="100000">
+              <a:schemeClr val="phClr">
+                <a:shade val="30000"/>
+                <a:satMod val="200000"/>
+              </a:schemeClr>
+            </a:gs>
+          </a:gsLst>
+          <a:path path="circle">
+            <a:fillToRect l="50000" t="50000" r="50000" b="50000"/>
+          </a:path>
+        </a:gradFill>
+      </a:bgFillStyleLst>
+    </a:fmtScheme>
+  </a:themeElements>
+  <a:objectDefaults/>
+  <a:extraClrSchemeLst/>
+</a:theme>
+</file>
+
+<file path=ppt/theme/theme3.xml><?xml version="1.0" encoding="utf-8"?>
+<a:theme xmlns:a="http://schemas.openxmlformats.org/drawingml/2006/main" name="Thème Office">
+  <a:themeElements>
+    <a:clrScheme name="Office">
+      <a:dk1>
+        <a:sysClr val="windowText" lastClr="000000"/>
+      </a:dk1>
+      <a:lt1>
+        <a:sysClr val="window" lastClr="FFFFFF"/>
+      </a:lt1>
+      <a:dk2>
+        <a:srgbClr val="1F497D"/>
+      </a:dk2>
+      <a:lt2>
+        <a:srgbClr val="EEECE1"/>
+      </a:lt2>
+      <a:accent1>
+        <a:srgbClr val="4F81BD"/>
+      </a:accent1>
+      <a:accent2>
+        <a:srgbClr val="C0504D"/>
+      </a:accent2>
+      <a:accent3>
+        <a:srgbClr val="9BBB59"/>
+      </a:accent3>
+      <a:accent4>
+        <a:srgbClr val="8064A2"/>
+      </a:accent4>
+      <a:accent5>
+        <a:srgbClr val="4BACC6"/>
+      </a:accent5>
+      <a:accent6>
+        <a:srgbClr val="F79646"/>
+      </a:accent6>
+      <a:hlink>
+        <a:srgbClr val="0000FF"/>
+      </a:hlink>
+      <a:folHlink>
+        <a:srgbClr val="800080"/>
+      </a:folHlink>
+    </a:clrScheme>
+    <a:fontScheme name="Office">
+      <a:majorFont>
+        <a:latin typeface="Calibri"/>
+        <a:ea typeface=""/>
+        <a:cs typeface=""/>
+        <a:font script="Jpan" typeface="ＭＳ Ｐゴシック"/>
+        <a:font script="Hang" typeface="맑은 고딕"/>
+        <a:font script="Hans" typeface="宋体"/>
+        <a:font script="Hant" typeface="新細明體"/>
+        <a:font script="Arab" typeface="Times New Roman"/>
+        <a:font script="Hebr" typeface="Times New Roman"/>
+        <a:font script="Thai" typeface="Angsana New"/>
+        <a:font script="Ethi" typeface="Nyala"/>
+        <a:font script="Beng" typeface="Vrinda"/>
+        <a:font script="Gujr" typeface="Shruti"/>
+        <a:font script="Khmr" typeface="MoolBoran"/>
+        <a:font script="Knda" typeface="Tunga"/>
+        <a:font script="Guru" typeface="Raavi"/>
+        <a:font script="Cans" typeface="Euphemia"/>
+        <a:font script="Cher" typeface="Plantagenet Cherokee"/>
+        <a:font script="Yiii" typeface="Microsoft Yi Baiti"/>
+        <a:font script="Tibt" typeface="Microsoft Himalaya"/>
+        <a:font script="Thaa" typeface="MV Boli"/>
+        <a:font script="Deva" typeface="Mangal"/>
+        <a:font script="Telu" typeface="Gautami"/>
+        <a:font script="Taml" typeface="Latha"/>
+        <a:font script="Syrc" typeface="Estrangelo Edessa"/>
+        <a:font script="Orya" typeface="Kalinga"/>
+        <a:font script="Mlym" typeface="Kartika"/>
+        <a:font script="Laoo" typeface="DokChampa"/>
+        <a:font script="Sinh" typeface="Iskoola Pota"/>
+        <a:font script="Mong" typeface="Mongolian Baiti"/>
+        <a:font script="Viet" typeface="Times New Roman"/>
+        <a:font script="Uigh" typeface="Microsoft Uighur"/>
+      </a:majorFont>
+      <a:minorFont>
+        <a:latin typeface="Calibri"/>
+        <a:ea typeface=""/>
+        <a:cs typeface=""/>
+        <a:font script="Jpan" typeface="ＭＳ Ｐゴシック"/>
+        <a:font script="Hang" typeface="맑은 고딕"/>
+        <a:font script="Hans" typeface="宋体"/>
+        <a:font script="Hant" typeface="新細明體"/>
+        <a:font script="Arab" typeface="Arial"/>
+        <a:font script="Hebr" typeface="Arial"/>
+        <a:font script="Thai" typeface="Cordia New"/>
+        <a:font script="Ethi" typeface="Nyala"/>
+        <a:font script="Beng" typeface="Vrinda"/>
+        <a:font script="Gujr" typeface="Shruti"/>
+        <a:font script="Khmr" typeface="DaunPenh"/>
+        <a:font script="Knda" typeface="Tunga"/>
+        <a:font script="Guru" typeface="Raavi"/>
+        <a:font script="Cans" typeface="Euphemia"/>
+        <a:font script="Cher" typeface="Plantagenet Cherokee"/>
+        <a:font script="Yiii" typeface="Microsoft Yi Baiti"/>
+        <a:font script="Tibt" typeface="Microsoft Himalaya"/>
+        <a:font script="Thaa" typeface="MV Boli"/>
+        <a:font script="Deva" typeface="Mangal"/>
+        <a:font script="Telu" typeface="Gautami"/>
+        <a:font script="Taml" typeface="Latha"/>
+        <a:font script="Syrc" typeface="Estrangelo Edessa"/>
+        <a:font script="Orya" typeface="Kalinga"/>
+        <a:font script="Mlym" typeface="Kartika"/>
+        <a:font script="Laoo" typeface="DokChampa"/>
+        <a:font script="Sinh" typeface="Iskoola Pota"/>
+        <a:font script="Mong" typeface="Mongolian Baiti"/>
+        <a:font script="Viet" typeface="Arial"/>
+        <a:font script="Uigh" typeface="Microsoft Uighur"/>
+      </a:minorFont>
+    </a:fontScheme>
+    <a:fmtScheme name="Office">
+      <a:fillStyleLst>
+        <a:solidFill>
+          <a:schemeClr val="phClr"/>
+        </a:solidFill>
+        <a:gradFill rotWithShape="1">
+          <a:gsLst>
+            <a:gs pos="0">
+              <a:schemeClr val="phClr">
+                <a:tint val="50000"/>
+                <a:satMod val="300000"/>
+              </a:schemeClr>
+            </a:gs>
+            <a:gs pos="35000">
+              <a:schemeClr val="phClr">
+                <a:tint val="37000"/>
+                <a:satMod val="300000"/>
+              </a:schemeClr>
+            </a:gs>
+            <a:gs pos="100000">
+              <a:schemeClr val="phClr">
+                <a:tint val="15000"/>
+                <a:satMod val="350000"/>
+              </a:schemeClr>
+            </a:gs>
+          </a:gsLst>
+          <a:lin ang="16200000" scaled="1"/>
+        </a:gradFill>
+        <a:gradFill rotWithShape="1">
+          <a:gsLst>
+            <a:gs pos="0">
+              <a:schemeClr val="phClr">
+                <a:shade val="51000"/>
+                <a:satMod val="130000"/>
+              </a:schemeClr>
+            </a:gs>
+            <a:gs pos="80000">
+              <a:schemeClr val="phClr">
+                <a:shade val="93000"/>
+                <a:satMod val="130000"/>
+              </a:schemeClr>
+            </a:gs>
+            <a:gs pos="100000">
+              <a:schemeClr val="phClr">
+                <a:shade val="94000"/>
+                <a:satMod val="135000"/>
+              </a:schemeClr>
+            </a:gs>
+          </a:gsLst>
+          <a:lin ang="16200000" scaled="0"/>
+        </a:gradFill>
+      </a:fillStyleLst>
+      <a:lnStyleLst>
+        <a:ln w="9525" cap="flat" cmpd="sng" algn="ctr">
+          <a:solidFill>
+            <a:schemeClr val="phClr">
+              <a:shade val="95000"/>
+              <a:satMod val="105000"/>
+            </a:schemeClr>
+          </a:solidFill>
+          <a:prstDash val="solid"/>
+        </a:ln>
+        <a:ln w="25400" cap="flat" cmpd="sng" algn="ctr">
+          <a:solidFill>
+            <a:schemeClr val="phClr"/>
+          </a:solidFill>
+          <a:prstDash val="solid"/>
+        </a:ln>
+        <a:ln w="38100" cap="flat" cmpd="sng" algn="ctr">
+          <a:solidFill>
+            <a:schemeClr val="phClr"/>
+          </a:solidFill>
+          <a:prstDash val="solid"/>
+        </a:ln>
+      </a:lnStyleLst>
+      <a:effectStyleLst>
+        <a:effectStyle>
+          <a:effectLst>
+            <a:outerShdw blurRad="40000" dist="20000" dir="5400000" rotWithShape="0">
+              <a:srgbClr val="000000">
+                <a:alpha val="38000"/>
+              </a:srgbClr>
+            </a:outerShdw>
+          </a:effectLst>
+        </a:effectStyle>
+        <a:effectStyle>
+          <a:effectLst>
+            <a:outerShdw blurRad="40000" dist="23000" dir="5400000" rotWithShape="0">
+              <a:srgbClr val="000000">
+                <a:alpha val="35000"/>
+              </a:srgbClr>
+            </a:outerShdw>
+          </a:effectLst>
+        </a:effectStyle>
+        <a:effectStyle>
+          <a:effectLst>
+            <a:outerShdw blurRad="40000" dist="23000" dir="5400000" rotWithShape="0">
+              <a:srgbClr val="000000">
+                <a:alpha val="35000"/>
+              </a:srgbClr>
+            </a:outerShdw>
+          </a:effectLst>
+          <a:scene3d>
+            <a:camera prst="orthographicFront">
+              <a:rot lat="0" lon="0" rev="0"/>
+            </a:camera>
+            <a:lightRig rig="threePt" dir="t">
+              <a:rot lat="0" lon="0" rev="1200000"/>
+            </a:lightRig>
+          </a:scene3d>
+          <a:sp3d>
+            <a:bevelT w="63500" h="25400"/>
+          </a:sp3d>
+        </a:effectStyle>
+      </a:effectStyleLst>
+      <a:bgFillStyleLst>
+        <a:solidFill>
+          <a:schemeClr val="phClr"/>
+        </a:solidFill>
+        <a:gradFill rotWithShape="1">
+          <a:gsLst>
+            <a:gs pos="0">
+              <a:schemeClr val="phClr">
+                <a:tint val="40000"/>
+                <a:satMod val="350000"/>
+              </a:schemeClr>
+            </a:gs>
+            <a:gs pos="40000">
+              <a:schemeClr val="phClr">
+                <a:tint val="45000"/>
+                <a:shade val="99000"/>
+                <a:satMod val="350000"/>
+              </a:schemeClr>
+            </a:gs>
+            <a:gs pos="100000">
+              <a:schemeClr val="phClr">
+                <a:shade val="20000"/>
+                <a:satMod val="255000"/>
+              </a:schemeClr>
+            </a:gs>
+          </a:gsLst>
+          <a:path path="circle">
+            <a:fillToRect l="50000" t="-80000" r="50000" b="180000"/>
+          </a:path>
+        </a:gradFill>
+        <a:gradFill rotWithShape="1">
+          <a:gsLst>
+            <a:gs pos="0">
+              <a:schemeClr val="phClr">
+                <a:tint val="80000"/>
+                <a:satMod val="300000"/>
+              </a:schemeClr>
+            </a:gs>
+            <a:gs pos="100000">
+              <a:schemeClr val="phClr">
+                <a:shade val="30000"/>
+                <a:satMod val="200000"/>
+              </a:schemeClr>
+            </a:gs>
+          </a:gsLst>
+          <a:path path="circle">
+            <a:fillToRect l="50000" t="50000" r="50000" b="50000"/>
+          </a:path>
+        </a:gradFill>
+      </a:bgFillStyleLst>
+    </a:fmtScheme>
+  </a:themeElements>
+  <a:objectDefaults/>
+  <a:extraClrSchemeLst/>
+</a:theme>
 </file>
</xml_diff>